<commit_message>
[WIP] Worked on logging (extending the verbose's logging functionality)
</commit_message>
<xml_diff>
--- a/documentation/slack-message-layout-a0100.pptx
+++ b/documentation/slack-message-layout-a0100.pptx
@@ -107,7 +107,7 @@
   <p:extLst>
     <p:ext uri="{EFAFB233-063F-42B5-8137-9DF3F51BA10A}">
       <p15:sldGuideLst xmlns:p15="http://schemas.microsoft.com/office/powerpoint/2012/main">
-        <p15:guide id="1" orient="horz" pos="2160" userDrawn="1">
+        <p15:guide id="1" orient="horz" pos="2137" userDrawn="1">
           <p15:clr>
             <a:srgbClr val="A4A3A4"/>
           </p15:clr>
@@ -270,7 +270,7 @@
           <a:p>
             <a:fld id="{0B0A0F4C-126D-8A45-B359-02513B63C221}" type="datetimeFigureOut">
               <a:rPr lang="de-DE" smtClean="0"/>
-              <a:t>06.11.23</a:t>
+              <a:t>10.11.23</a:t>
             </a:fld>
             <a:endParaRPr lang="de-DE"/>
           </a:p>
@@ -468,7 +468,7 @@
           <a:p>
             <a:fld id="{0B0A0F4C-126D-8A45-B359-02513B63C221}" type="datetimeFigureOut">
               <a:rPr lang="de-DE" smtClean="0"/>
-              <a:t>06.11.23</a:t>
+              <a:t>10.11.23</a:t>
             </a:fld>
             <a:endParaRPr lang="de-DE"/>
           </a:p>
@@ -676,7 +676,7 @@
           <a:p>
             <a:fld id="{0B0A0F4C-126D-8A45-B359-02513B63C221}" type="datetimeFigureOut">
               <a:rPr lang="de-DE" smtClean="0"/>
-              <a:t>06.11.23</a:t>
+              <a:t>10.11.23</a:t>
             </a:fld>
             <a:endParaRPr lang="de-DE"/>
           </a:p>
@@ -874,7 +874,7 @@
           <a:p>
             <a:fld id="{0B0A0F4C-126D-8A45-B359-02513B63C221}" type="datetimeFigureOut">
               <a:rPr lang="de-DE" smtClean="0"/>
-              <a:t>06.11.23</a:t>
+              <a:t>10.11.23</a:t>
             </a:fld>
             <a:endParaRPr lang="de-DE"/>
           </a:p>
@@ -1149,7 +1149,7 @@
           <a:p>
             <a:fld id="{0B0A0F4C-126D-8A45-B359-02513B63C221}" type="datetimeFigureOut">
               <a:rPr lang="de-DE" smtClean="0"/>
-              <a:t>06.11.23</a:t>
+              <a:t>10.11.23</a:t>
             </a:fld>
             <a:endParaRPr lang="de-DE"/>
           </a:p>
@@ -1414,7 +1414,7 @@
           <a:p>
             <a:fld id="{0B0A0F4C-126D-8A45-B359-02513B63C221}" type="datetimeFigureOut">
               <a:rPr lang="de-DE" smtClean="0"/>
-              <a:t>06.11.23</a:t>
+              <a:t>10.11.23</a:t>
             </a:fld>
             <a:endParaRPr lang="de-DE"/>
           </a:p>
@@ -1826,7 +1826,7 @@
           <a:p>
             <a:fld id="{0B0A0F4C-126D-8A45-B359-02513B63C221}" type="datetimeFigureOut">
               <a:rPr lang="de-DE" smtClean="0"/>
-              <a:t>06.11.23</a:t>
+              <a:t>10.11.23</a:t>
             </a:fld>
             <a:endParaRPr lang="de-DE"/>
           </a:p>
@@ -1967,7 +1967,7 @@
           <a:p>
             <a:fld id="{0B0A0F4C-126D-8A45-B359-02513B63C221}" type="datetimeFigureOut">
               <a:rPr lang="de-DE" smtClean="0"/>
-              <a:t>06.11.23</a:t>
+              <a:t>10.11.23</a:t>
             </a:fld>
             <a:endParaRPr lang="de-DE"/>
           </a:p>
@@ -2080,7 +2080,7 @@
           <a:p>
             <a:fld id="{0B0A0F4C-126D-8A45-B359-02513B63C221}" type="datetimeFigureOut">
               <a:rPr lang="de-DE" smtClean="0"/>
-              <a:t>06.11.23</a:t>
+              <a:t>10.11.23</a:t>
             </a:fld>
             <a:endParaRPr lang="de-DE"/>
           </a:p>
@@ -2391,7 +2391,7 @@
           <a:p>
             <a:fld id="{0B0A0F4C-126D-8A45-B359-02513B63C221}" type="datetimeFigureOut">
               <a:rPr lang="de-DE" smtClean="0"/>
-              <a:t>06.11.23</a:t>
+              <a:t>10.11.23</a:t>
             </a:fld>
             <a:endParaRPr lang="de-DE"/>
           </a:p>
@@ -2679,7 +2679,7 @@
           <a:p>
             <a:fld id="{0B0A0F4C-126D-8A45-B359-02513B63C221}" type="datetimeFigureOut">
               <a:rPr lang="de-DE" smtClean="0"/>
-              <a:t>06.11.23</a:t>
+              <a:t>10.11.23</a:t>
             </a:fld>
             <a:endParaRPr lang="de-DE"/>
           </a:p>
@@ -2920,7 +2920,7 @@
           <a:p>
             <a:fld id="{0B0A0F4C-126D-8A45-B359-02513B63C221}" type="datetimeFigureOut">
               <a:rPr lang="de-DE" smtClean="0"/>
-              <a:t>06.11.23</a:t>
+              <a:t>10.11.23</a:t>
             </a:fld>
             <a:endParaRPr lang="de-DE"/>
           </a:p>
@@ -3351,8 +3351,8 @@
         </p:nvSpPr>
         <p:spPr>
           <a:xfrm>
-            <a:off x="3482941" y="811660"/>
-            <a:ext cx="5239820" cy="5239820"/>
+            <a:off x="3482941" y="78490"/>
+            <a:ext cx="5239820" cy="6699266"/>
           </a:xfrm>
           <a:prstGeom prst="rect">
             <a:avLst/>
@@ -3399,7 +3399,7 @@
         </p:nvSpPr>
         <p:spPr>
           <a:xfrm>
-            <a:off x="4171306" y="945222"/>
+            <a:off x="4171306" y="212052"/>
             <a:ext cx="3647327" cy="276999"/>
           </a:xfrm>
           <a:prstGeom prst="rect">
@@ -3418,17 +3418,416 @@
                 <a:latin typeface="Roboto Mono" pitchFamily="49" charset="0"/>
                 <a:ea typeface="Roboto Mono" pitchFamily="49" charset="0"/>
               </a:rPr>
-              <a:t>Nerthus Integration</a:t>
-            </a:r>
-          </a:p>
-        </p:txBody>
-      </p:sp>
-      <p:sp>
-        <p:nvSpPr>
-          <p:cNvPr id="6" name="Textfeld 5">
-            <a:extLst>
-              <a:ext uri="{FF2B5EF4-FFF2-40B4-BE49-F238E27FC236}">
-                <a16:creationId xmlns:a16="http://schemas.microsoft.com/office/drawing/2014/main" id="{13D7041F-132B-BD0A-4964-6C4C55D6BB41}"/>
+              <a:t>Nerthus</a:t>
+            </a:r>
+          </a:p>
+        </p:txBody>
+      </p:sp>
+      <p:grpSp>
+        <p:nvGrpSpPr>
+          <p:cNvPr id="40" name="Gruppieren 39">
+            <a:extLst>
+              <a:ext uri="{FF2B5EF4-FFF2-40B4-BE49-F238E27FC236}">
+                <a16:creationId xmlns:a16="http://schemas.microsoft.com/office/drawing/2014/main" id="{6268E6F8-0776-DFE1-44EF-E9EB9712B960}"/>
+              </a:ext>
+            </a:extLst>
+          </p:cNvPr>
+          <p:cNvGrpSpPr/>
+          <p:nvPr/>
+        </p:nvGrpSpPr>
+        <p:grpSpPr>
+          <a:xfrm>
+            <a:off x="3563995" y="1130424"/>
+            <a:ext cx="4513874" cy="276999"/>
+            <a:chOff x="3563995" y="1345271"/>
+            <a:chExt cx="4513874" cy="276999"/>
+          </a:xfrm>
+        </p:grpSpPr>
+        <p:sp>
+          <p:nvSpPr>
+            <p:cNvPr id="6" name="Textfeld 5">
+              <a:extLst>
+                <a:ext uri="{FF2B5EF4-FFF2-40B4-BE49-F238E27FC236}">
+                  <a16:creationId xmlns:a16="http://schemas.microsoft.com/office/drawing/2014/main" id="{13D7041F-132B-BD0A-4964-6C4C55D6BB41}"/>
+                </a:ext>
+              </a:extLst>
+            </p:cNvPr>
+            <p:cNvSpPr txBox="1"/>
+            <p:nvPr/>
+          </p:nvSpPr>
+          <p:spPr>
+            <a:xfrm>
+              <a:off x="3563995" y="1345271"/>
+              <a:ext cx="934949" cy="276999"/>
+            </a:xfrm>
+            <a:prstGeom prst="rect">
+              <a:avLst/>
+            </a:prstGeom>
+            <a:noFill/>
+          </p:spPr>
+          <p:txBody>
+            <a:bodyPr wrap="square" rtlCol="0">
+              <a:spAutoFit/>
+            </a:bodyPr>
+            <a:lstStyle/>
+            <a:p>
+              <a:r>
+                <a:rPr lang="de-DE" sz="1200" dirty="0">
+                  <a:latin typeface="Roboto Mono" pitchFamily="49" charset="0"/>
+                  <a:ea typeface="Roboto Mono" pitchFamily="49" charset="0"/>
+                </a:rPr>
+                <a:t>DOMAIN: </a:t>
+              </a:r>
+            </a:p>
+          </p:txBody>
+        </p:sp>
+        <p:sp>
+          <p:nvSpPr>
+            <p:cNvPr id="7" name="Textfeld 6">
+              <a:extLst>
+                <a:ext uri="{FF2B5EF4-FFF2-40B4-BE49-F238E27FC236}">
+                  <a16:creationId xmlns:a16="http://schemas.microsoft.com/office/drawing/2014/main" id="{420CB4B8-8BF2-89D0-51FB-EE25779A1C4B}"/>
+                </a:ext>
+              </a:extLst>
+            </p:cNvPr>
+            <p:cNvSpPr txBox="1"/>
+            <p:nvPr/>
+          </p:nvSpPr>
+          <p:spPr>
+            <a:xfrm>
+              <a:off x="5210758" y="1345271"/>
+              <a:ext cx="2867111" cy="276999"/>
+            </a:xfrm>
+            <a:prstGeom prst="rect">
+              <a:avLst/>
+            </a:prstGeom>
+            <a:noFill/>
+          </p:spPr>
+          <p:txBody>
+            <a:bodyPr wrap="square" rtlCol="0">
+              <a:spAutoFit/>
+            </a:bodyPr>
+            <a:lstStyle/>
+            <a:p>
+              <a:r>
+                <a:rPr lang="de-DE" sz="1200" b="1" dirty="0">
+                  <a:latin typeface="Roboto Mono" pitchFamily="49" charset="0"/>
+                  <a:ea typeface="Roboto Mono" pitchFamily="49" charset="0"/>
+                </a:rPr>
+                <a:t>1 : </a:t>
+              </a:r>
+              <a:r>
+                <a:rPr lang="de-DE" sz="1200" b="1" dirty="0" err="1">
+                  <a:latin typeface="Roboto Mono" pitchFamily="49" charset="0"/>
+                  <a:ea typeface="Roboto Mono" pitchFamily="49" charset="0"/>
+                </a:rPr>
+                <a:t>ThingBone</a:t>
+              </a:r>
+              <a:endParaRPr lang="de-DE" sz="1200" b="1" dirty="0">
+                <a:latin typeface="Roboto Mono" pitchFamily="49" charset="0"/>
+                <a:ea typeface="Roboto Mono" pitchFamily="49" charset="0"/>
+              </a:endParaRPr>
+            </a:p>
+          </p:txBody>
+        </p:sp>
+      </p:grpSp>
+      <p:grpSp>
+        <p:nvGrpSpPr>
+          <p:cNvPr id="41" name="Gruppieren 40">
+            <a:extLst>
+              <a:ext uri="{FF2B5EF4-FFF2-40B4-BE49-F238E27FC236}">
+                <a16:creationId xmlns:a16="http://schemas.microsoft.com/office/drawing/2014/main" id="{7A47A404-EC61-BCD8-4E57-5F1DE148C2EA}"/>
+              </a:ext>
+            </a:extLst>
+          </p:cNvPr>
+          <p:cNvGrpSpPr/>
+          <p:nvPr/>
+        </p:nvGrpSpPr>
+        <p:grpSpPr>
+          <a:xfrm>
+            <a:off x="3563995" y="1592442"/>
+            <a:ext cx="3824405" cy="276999"/>
+            <a:chOff x="3563995" y="1622226"/>
+            <a:chExt cx="3824405" cy="276999"/>
+          </a:xfrm>
+        </p:grpSpPr>
+        <p:sp>
+          <p:nvSpPr>
+            <p:cNvPr id="8" name="Textfeld 7">
+              <a:extLst>
+                <a:ext uri="{FF2B5EF4-FFF2-40B4-BE49-F238E27FC236}">
+                  <a16:creationId xmlns:a16="http://schemas.microsoft.com/office/drawing/2014/main" id="{90E6C3BC-5333-5DCC-E2F4-97E0CB444647}"/>
+                </a:ext>
+              </a:extLst>
+            </p:cNvPr>
+            <p:cNvSpPr txBox="1"/>
+            <p:nvPr/>
+          </p:nvSpPr>
+          <p:spPr>
+            <a:xfrm>
+              <a:off x="3563995" y="1622226"/>
+              <a:ext cx="1674026" cy="276999"/>
+            </a:xfrm>
+            <a:prstGeom prst="rect">
+              <a:avLst/>
+            </a:prstGeom>
+            <a:noFill/>
+          </p:spPr>
+          <p:txBody>
+            <a:bodyPr wrap="square" rtlCol="0">
+              <a:spAutoFit/>
+            </a:bodyPr>
+            <a:lstStyle/>
+            <a:p>
+              <a:r>
+                <a:rPr lang="de-DE" sz="1200" dirty="0">
+                  <a:latin typeface="Roboto Mono" pitchFamily="49" charset="0"/>
+                  <a:ea typeface="Roboto Mono" pitchFamily="49" charset="0"/>
+                </a:rPr>
+                <a:t>DEVICE LOCATION: </a:t>
+              </a:r>
+            </a:p>
+          </p:txBody>
+        </p:sp>
+        <p:sp>
+          <p:nvSpPr>
+            <p:cNvPr id="9" name="Textfeld 8">
+              <a:extLst>
+                <a:ext uri="{FF2B5EF4-FFF2-40B4-BE49-F238E27FC236}">
+                  <a16:creationId xmlns:a16="http://schemas.microsoft.com/office/drawing/2014/main" id="{4EE8A300-9548-A63B-B7E8-7CA63050534D}"/>
+                </a:ext>
+              </a:extLst>
+            </p:cNvPr>
+            <p:cNvSpPr txBox="1"/>
+            <p:nvPr/>
+          </p:nvSpPr>
+          <p:spPr>
+            <a:xfrm>
+              <a:off x="5210758" y="1622226"/>
+              <a:ext cx="2177642" cy="276999"/>
+            </a:xfrm>
+            <a:prstGeom prst="rect">
+              <a:avLst/>
+            </a:prstGeom>
+            <a:noFill/>
+          </p:spPr>
+          <p:txBody>
+            <a:bodyPr wrap="square" rtlCol="0">
+              <a:spAutoFit/>
+            </a:bodyPr>
+            <a:lstStyle/>
+            <a:p>
+              <a:r>
+                <a:rPr lang="de-DE" sz="1200" b="1" dirty="0">
+                  <a:latin typeface="Roboto Mono" pitchFamily="49" charset="0"/>
+                  <a:ea typeface="Roboto Mono" pitchFamily="49" charset="0"/>
+                </a:rPr>
+                <a:t>Earth</a:t>
+              </a:r>
+            </a:p>
+          </p:txBody>
+        </p:sp>
+      </p:grpSp>
+      <p:grpSp>
+        <p:nvGrpSpPr>
+          <p:cNvPr id="39" name="Gruppieren 38">
+            <a:extLst>
+              <a:ext uri="{FF2B5EF4-FFF2-40B4-BE49-F238E27FC236}">
+                <a16:creationId xmlns:a16="http://schemas.microsoft.com/office/drawing/2014/main" id="{BD3F7A6C-6798-6064-B0A2-91C581095680}"/>
+              </a:ext>
+            </a:extLst>
+          </p:cNvPr>
+          <p:cNvGrpSpPr/>
+          <p:nvPr/>
+        </p:nvGrpSpPr>
+        <p:grpSpPr>
+          <a:xfrm>
+            <a:off x="3563995" y="899415"/>
+            <a:ext cx="3824405" cy="276999"/>
+            <a:chOff x="3563995" y="1045610"/>
+            <a:chExt cx="3824405" cy="276999"/>
+          </a:xfrm>
+        </p:grpSpPr>
+        <p:sp>
+          <p:nvSpPr>
+            <p:cNvPr id="10" name="Textfeld 9">
+              <a:extLst>
+                <a:ext uri="{FF2B5EF4-FFF2-40B4-BE49-F238E27FC236}">
+                  <a16:creationId xmlns:a16="http://schemas.microsoft.com/office/drawing/2014/main" id="{2C6DB231-C392-B6FF-53D8-B8AEA9EFA859}"/>
+                </a:ext>
+              </a:extLst>
+            </p:cNvPr>
+            <p:cNvSpPr txBox="1"/>
+            <p:nvPr/>
+          </p:nvSpPr>
+          <p:spPr>
+            <a:xfrm>
+              <a:off x="3563995" y="1045610"/>
+              <a:ext cx="1676407" cy="276999"/>
+            </a:xfrm>
+            <a:prstGeom prst="rect">
+              <a:avLst/>
+            </a:prstGeom>
+            <a:noFill/>
+          </p:spPr>
+          <p:txBody>
+            <a:bodyPr wrap="square" rtlCol="0">
+              <a:spAutoFit/>
+            </a:bodyPr>
+            <a:lstStyle/>
+            <a:p>
+              <a:r>
+                <a:rPr lang="de-DE" sz="1200" dirty="0">
+                  <a:latin typeface="Roboto Mono" pitchFamily="49" charset="0"/>
+                  <a:ea typeface="Roboto Mono" pitchFamily="49" charset="0"/>
+                </a:rPr>
+                <a:t>APPLICATION: </a:t>
+              </a:r>
+            </a:p>
+          </p:txBody>
+        </p:sp>
+        <p:sp>
+          <p:nvSpPr>
+            <p:cNvPr id="11" name="Textfeld 10">
+              <a:extLst>
+                <a:ext uri="{FF2B5EF4-FFF2-40B4-BE49-F238E27FC236}">
+                  <a16:creationId xmlns:a16="http://schemas.microsoft.com/office/drawing/2014/main" id="{ECB4D198-84AA-D88B-AA97-F77B1EDC63D9}"/>
+                </a:ext>
+              </a:extLst>
+            </p:cNvPr>
+            <p:cNvSpPr txBox="1"/>
+            <p:nvPr/>
+          </p:nvSpPr>
+          <p:spPr>
+            <a:xfrm>
+              <a:off x="5210758" y="1045610"/>
+              <a:ext cx="2177642" cy="276999"/>
+            </a:xfrm>
+            <a:prstGeom prst="rect">
+              <a:avLst/>
+            </a:prstGeom>
+            <a:noFill/>
+          </p:spPr>
+          <p:txBody>
+            <a:bodyPr wrap="square" rtlCol="0">
+              <a:spAutoFit/>
+            </a:bodyPr>
+            <a:lstStyle/>
+            <a:p>
+              <a:r>
+                <a:rPr lang="de-DE" sz="1200" b="1" dirty="0">
+                  <a:latin typeface="Roboto Mono" pitchFamily="49" charset="0"/>
+                  <a:ea typeface="Roboto Mono" pitchFamily="49" charset="0"/>
+                </a:rPr>
+                <a:t>ADTLATUS</a:t>
+              </a:r>
+            </a:p>
+          </p:txBody>
+        </p:sp>
+      </p:grpSp>
+      <p:grpSp>
+        <p:nvGrpSpPr>
+          <p:cNvPr id="45" name="Gruppieren 44">
+            <a:extLst>
+              <a:ext uri="{FF2B5EF4-FFF2-40B4-BE49-F238E27FC236}">
+                <a16:creationId xmlns:a16="http://schemas.microsoft.com/office/drawing/2014/main" id="{B4D651C1-D1FB-5D19-3839-962843EC1BB6}"/>
+              </a:ext>
+            </a:extLst>
+          </p:cNvPr>
+          <p:cNvGrpSpPr/>
+          <p:nvPr/>
+        </p:nvGrpSpPr>
+        <p:grpSpPr>
+          <a:xfrm>
+            <a:off x="3555757" y="1823453"/>
+            <a:ext cx="5158766" cy="276999"/>
+            <a:chOff x="3563995" y="1938785"/>
+            <a:chExt cx="5158766" cy="276999"/>
+          </a:xfrm>
+        </p:grpSpPr>
+        <p:sp>
+          <p:nvSpPr>
+            <p:cNvPr id="18" name="Textfeld 17">
+              <a:extLst>
+                <a:ext uri="{FF2B5EF4-FFF2-40B4-BE49-F238E27FC236}">
+                  <a16:creationId xmlns:a16="http://schemas.microsoft.com/office/drawing/2014/main" id="{396809C0-69C8-EDD9-C42F-95DC70E744D1}"/>
+                </a:ext>
+              </a:extLst>
+            </p:cNvPr>
+            <p:cNvSpPr txBox="1"/>
+            <p:nvPr/>
+          </p:nvSpPr>
+          <p:spPr>
+            <a:xfrm>
+              <a:off x="3563995" y="1938785"/>
+              <a:ext cx="1387012" cy="276999"/>
+            </a:xfrm>
+            <a:prstGeom prst="rect">
+              <a:avLst/>
+            </a:prstGeom>
+            <a:noFill/>
+          </p:spPr>
+          <p:txBody>
+            <a:bodyPr wrap="square" rtlCol="0">
+              <a:spAutoFit/>
+            </a:bodyPr>
+            <a:lstStyle/>
+            <a:p>
+              <a:r>
+                <a:rPr lang="de-DE" sz="1200" dirty="0">
+                  <a:latin typeface="Roboto Mono" pitchFamily="49" charset="0"/>
+                  <a:ea typeface="Roboto Mono" pitchFamily="49" charset="0"/>
+                </a:rPr>
+                <a:t>TIMESTAMP: </a:t>
+              </a:r>
+            </a:p>
+          </p:txBody>
+        </p:sp>
+        <p:sp>
+          <p:nvSpPr>
+            <p:cNvPr id="19" name="Textfeld 18">
+              <a:extLst>
+                <a:ext uri="{FF2B5EF4-FFF2-40B4-BE49-F238E27FC236}">
+                  <a16:creationId xmlns:a16="http://schemas.microsoft.com/office/drawing/2014/main" id="{09EDC858-1AA0-1AB6-10D7-ACB15C33B801}"/>
+                </a:ext>
+              </a:extLst>
+            </p:cNvPr>
+            <p:cNvSpPr txBox="1"/>
+            <p:nvPr/>
+          </p:nvSpPr>
+          <p:spPr>
+            <a:xfrm>
+              <a:off x="5210758" y="1938785"/>
+              <a:ext cx="3512003" cy="276999"/>
+            </a:xfrm>
+            <a:prstGeom prst="rect">
+              <a:avLst/>
+            </a:prstGeom>
+            <a:noFill/>
+          </p:spPr>
+          <p:txBody>
+            <a:bodyPr wrap="square" rtlCol="0">
+              <a:spAutoFit/>
+            </a:bodyPr>
+            <a:lstStyle/>
+            <a:p>
+              <a:r>
+                <a:rPr lang="de-DE" sz="1200" b="1" dirty="0">
+                  <a:latin typeface="Roboto Mono" pitchFamily="49" charset="0"/>
+                  <a:ea typeface="Roboto Mono" pitchFamily="49" charset="0"/>
+                </a:rPr>
+                <a:t>2023-11-06T17:55:21.340587401+01:00</a:t>
+              </a:r>
+            </a:p>
+          </p:txBody>
+        </p:sp>
+      </p:grpSp>
+      <p:sp>
+        <p:nvSpPr>
+          <p:cNvPr id="2" name="Textfeld 1">
+            <a:extLst>
+              <a:ext uri="{FF2B5EF4-FFF2-40B4-BE49-F238E27FC236}">
+                <a16:creationId xmlns:a16="http://schemas.microsoft.com/office/drawing/2014/main" id="{1F9B742E-87FE-E3A1-855F-969C7868453F}"/>
               </a:ext>
             </a:extLst>
           </p:cNvPr>
@@ -3437,8 +3836,1220 @@
         </p:nvSpPr>
         <p:spPr>
           <a:xfrm>
-            <a:off x="3688423" y="1550947"/>
-            <a:ext cx="934949" cy="276999"/>
+            <a:off x="3575407" y="567788"/>
+            <a:ext cx="4941869" cy="276999"/>
+          </a:xfrm>
+          <a:prstGeom prst="rect">
+            <a:avLst/>
+          </a:prstGeom>
+          <a:solidFill>
+            <a:srgbClr val="FF0000"/>
+          </a:solidFill>
+        </p:spPr>
+        <p:txBody>
+          <a:bodyPr wrap="square" rtlCol="0">
+            <a:spAutoFit/>
+          </a:bodyPr>
+          <a:lstStyle/>
+          <a:p>
+            <a:pPr marL="92075" algn="ctr"/>
+            <a:r>
+              <a:rPr lang="de-DE" sz="1200" dirty="0">
+                <a:solidFill>
+                  <a:schemeClr val="bg1"/>
+                </a:solidFill>
+                <a:latin typeface="Roboto Mono" pitchFamily="49" charset="0"/>
+                <a:ea typeface="Roboto Mono" pitchFamily="49" charset="0"/>
+              </a:rPr>
+              <a:t>ERROR</a:t>
+            </a:r>
+          </a:p>
+        </p:txBody>
+      </p:sp>
+      <p:grpSp>
+        <p:nvGrpSpPr>
+          <p:cNvPr id="47" name="Gruppieren 46">
+            <a:extLst>
+              <a:ext uri="{FF2B5EF4-FFF2-40B4-BE49-F238E27FC236}">
+                <a16:creationId xmlns:a16="http://schemas.microsoft.com/office/drawing/2014/main" id="{D27D33D7-97F0-459C-6FB6-E7D2EBC92E28}"/>
+              </a:ext>
+            </a:extLst>
+          </p:cNvPr>
+          <p:cNvGrpSpPr/>
+          <p:nvPr/>
+        </p:nvGrpSpPr>
+        <p:grpSpPr>
+          <a:xfrm>
+            <a:off x="3555987" y="2328177"/>
+            <a:ext cx="5088849" cy="276999"/>
+            <a:chOff x="3613653" y="2665930"/>
+            <a:chExt cx="5088849" cy="276999"/>
+          </a:xfrm>
+        </p:grpSpPr>
+        <p:sp>
+          <p:nvSpPr>
+            <p:cNvPr id="14" name="Textfeld 13">
+              <a:extLst>
+                <a:ext uri="{FF2B5EF4-FFF2-40B4-BE49-F238E27FC236}">
+                  <a16:creationId xmlns:a16="http://schemas.microsoft.com/office/drawing/2014/main" id="{5C01DC57-146D-6B20-836E-E84798A36882}"/>
+                </a:ext>
+              </a:extLst>
+            </p:cNvPr>
+            <p:cNvSpPr txBox="1"/>
+            <p:nvPr/>
+          </p:nvSpPr>
+          <p:spPr>
+            <a:xfrm>
+              <a:off x="3613653" y="2665930"/>
+              <a:ext cx="1676407" cy="276999"/>
+            </a:xfrm>
+            <a:prstGeom prst="rect">
+              <a:avLst/>
+            </a:prstGeom>
+            <a:noFill/>
+          </p:spPr>
+          <p:txBody>
+            <a:bodyPr wrap="square" rtlCol="0">
+              <a:spAutoFit/>
+            </a:bodyPr>
+            <a:lstStyle/>
+            <a:p>
+              <a:r>
+                <a:rPr lang="de-DE" sz="1200" dirty="0">
+                  <a:latin typeface="Roboto Mono" pitchFamily="49" charset="0"/>
+                  <a:ea typeface="Roboto Mono" pitchFamily="49" charset="0"/>
+                </a:rPr>
+                <a:t>MESSAGE CODE : </a:t>
+              </a:r>
+            </a:p>
+          </p:txBody>
+        </p:sp>
+        <p:sp>
+          <p:nvSpPr>
+            <p:cNvPr id="15" name="Textfeld 14">
+              <a:extLst>
+                <a:ext uri="{FF2B5EF4-FFF2-40B4-BE49-F238E27FC236}">
+                  <a16:creationId xmlns:a16="http://schemas.microsoft.com/office/drawing/2014/main" id="{F23E0D5E-BAA2-9BAE-3975-EB6600703280}"/>
+                </a:ext>
+              </a:extLst>
+            </p:cNvPr>
+            <p:cNvSpPr txBox="1"/>
+            <p:nvPr/>
+          </p:nvSpPr>
+          <p:spPr>
+            <a:xfrm>
+              <a:off x="5210758" y="2665930"/>
+              <a:ext cx="979478" cy="276999"/>
+            </a:xfrm>
+            <a:prstGeom prst="rect">
+              <a:avLst/>
+            </a:prstGeom>
+            <a:noFill/>
+          </p:spPr>
+          <p:txBody>
+            <a:bodyPr wrap="square" rtlCol="0">
+              <a:spAutoFit/>
+            </a:bodyPr>
+            <a:lstStyle/>
+            <a:p>
+              <a:r>
+                <a:rPr lang="de-DE" sz="1200" b="1" dirty="0">
+                  <a:latin typeface="Roboto Mono" pitchFamily="49" charset="0"/>
+                  <a:ea typeface="Roboto Mono" pitchFamily="49" charset="0"/>
+                </a:rPr>
+                <a:t>10100021</a:t>
+              </a:r>
+            </a:p>
+          </p:txBody>
+        </p:sp>
+        <p:sp>
+          <p:nvSpPr>
+            <p:cNvPr id="16" name="Textfeld 15">
+              <a:extLst>
+                <a:ext uri="{FF2B5EF4-FFF2-40B4-BE49-F238E27FC236}">
+                  <a16:creationId xmlns:a16="http://schemas.microsoft.com/office/drawing/2014/main" id="{C6FD8EB7-71F3-C4E6-E306-491348683C5A}"/>
+                </a:ext>
+              </a:extLst>
+            </p:cNvPr>
+            <p:cNvSpPr txBox="1"/>
+            <p:nvPr/>
+          </p:nvSpPr>
+          <p:spPr>
+            <a:xfrm>
+              <a:off x="6178214" y="2665930"/>
+              <a:ext cx="1676407" cy="276999"/>
+            </a:xfrm>
+            <a:prstGeom prst="rect">
+              <a:avLst/>
+            </a:prstGeom>
+            <a:noFill/>
+          </p:spPr>
+          <p:txBody>
+            <a:bodyPr wrap="square" rtlCol="0">
+              <a:spAutoFit/>
+            </a:bodyPr>
+            <a:lstStyle/>
+            <a:p>
+              <a:r>
+                <a:rPr lang="de-DE" sz="1200" dirty="0">
+                  <a:latin typeface="Roboto Mono" pitchFamily="49" charset="0"/>
+                  <a:ea typeface="Roboto Mono" pitchFamily="49" charset="0"/>
+                </a:rPr>
+                <a:t>REASON CODE : </a:t>
+              </a:r>
+            </a:p>
+          </p:txBody>
+        </p:sp>
+        <p:sp>
+          <p:nvSpPr>
+            <p:cNvPr id="20" name="Textfeld 19">
+              <a:extLst>
+                <a:ext uri="{FF2B5EF4-FFF2-40B4-BE49-F238E27FC236}">
+                  <a16:creationId xmlns:a16="http://schemas.microsoft.com/office/drawing/2014/main" id="{6909CC12-5FA0-DE21-9F22-FCA1BF22A4CC}"/>
+                </a:ext>
+              </a:extLst>
+            </p:cNvPr>
+            <p:cNvSpPr txBox="1"/>
+            <p:nvPr/>
+          </p:nvSpPr>
+          <p:spPr>
+            <a:xfrm>
+              <a:off x="7723025" y="2665930"/>
+              <a:ext cx="979477" cy="276999"/>
+            </a:xfrm>
+            <a:prstGeom prst="rect">
+              <a:avLst/>
+            </a:prstGeom>
+            <a:noFill/>
+          </p:spPr>
+          <p:txBody>
+            <a:bodyPr wrap="square" rtlCol="0">
+              <a:spAutoFit/>
+            </a:bodyPr>
+            <a:lstStyle/>
+            <a:p>
+              <a:r>
+                <a:rPr lang="de-DE" sz="1200" b="1" dirty="0">
+                  <a:latin typeface="Roboto Mono" pitchFamily="49" charset="0"/>
+                  <a:ea typeface="Roboto Mono" pitchFamily="49" charset="0"/>
+                </a:rPr>
+                <a:t>10131097</a:t>
+              </a:r>
+            </a:p>
+          </p:txBody>
+        </p:sp>
+      </p:grpSp>
+      <p:cxnSp>
+        <p:nvCxnSpPr>
+          <p:cNvPr id="22" name="Gerade Verbindung 21">
+            <a:extLst>
+              <a:ext uri="{FF2B5EF4-FFF2-40B4-BE49-F238E27FC236}">
+                <a16:creationId xmlns:a16="http://schemas.microsoft.com/office/drawing/2014/main" id="{D8E2DA29-6247-DE67-F7E8-03C1AC67E055}"/>
+              </a:ext>
+            </a:extLst>
+          </p:cNvPr>
+          <p:cNvCxnSpPr>
+            <a:cxnSpLocks/>
+          </p:cNvCxnSpPr>
+          <p:nvPr/>
+        </p:nvCxnSpPr>
+        <p:spPr>
+          <a:xfrm>
+            <a:off x="3575407" y="912453"/>
+            <a:ext cx="4941869" cy="0"/>
+          </a:xfrm>
+          <a:prstGeom prst="line">
+            <a:avLst/>
+          </a:prstGeom>
+          <a:ln>
+            <a:solidFill>
+              <a:schemeClr val="bg1">
+                <a:lumMod val="85000"/>
+              </a:schemeClr>
+            </a:solidFill>
+          </a:ln>
+        </p:spPr>
+        <p:style>
+          <a:lnRef idx="2">
+            <a:schemeClr val="accent1"/>
+          </a:lnRef>
+          <a:fillRef idx="0">
+            <a:schemeClr val="accent1"/>
+          </a:fillRef>
+          <a:effectRef idx="1">
+            <a:schemeClr val="accent1"/>
+          </a:effectRef>
+          <a:fontRef idx="minor">
+            <a:schemeClr val="tx1"/>
+          </a:fontRef>
+        </p:style>
+      </p:cxnSp>
+      <p:cxnSp>
+        <p:nvCxnSpPr>
+          <p:cNvPr id="23" name="Gerade Verbindung 22">
+            <a:extLst>
+              <a:ext uri="{FF2B5EF4-FFF2-40B4-BE49-F238E27FC236}">
+                <a16:creationId xmlns:a16="http://schemas.microsoft.com/office/drawing/2014/main" id="{9A7F0B2F-5CDC-C634-A98D-36FC26A0FE3D}"/>
+              </a:ext>
+            </a:extLst>
+          </p:cNvPr>
+          <p:cNvCxnSpPr>
+            <a:cxnSpLocks/>
+          </p:cNvCxnSpPr>
+          <p:nvPr/>
+        </p:nvCxnSpPr>
+        <p:spPr>
+          <a:xfrm>
+            <a:off x="3625065" y="2316315"/>
+            <a:ext cx="4941869" cy="0"/>
+          </a:xfrm>
+          <a:prstGeom prst="line">
+            <a:avLst/>
+          </a:prstGeom>
+          <a:ln>
+            <a:solidFill>
+              <a:schemeClr val="bg1">
+                <a:lumMod val="85000"/>
+              </a:schemeClr>
+            </a:solidFill>
+          </a:ln>
+        </p:spPr>
+        <p:style>
+          <a:lnRef idx="2">
+            <a:schemeClr val="accent1"/>
+          </a:lnRef>
+          <a:fillRef idx="0">
+            <a:schemeClr val="accent1"/>
+          </a:fillRef>
+          <a:effectRef idx="1">
+            <a:schemeClr val="accent1"/>
+          </a:effectRef>
+          <a:fontRef idx="minor">
+            <a:schemeClr val="tx1"/>
+          </a:fontRef>
+        </p:style>
+      </p:cxnSp>
+      <p:cxnSp>
+        <p:nvCxnSpPr>
+          <p:cNvPr id="24" name="Gerade Verbindung 23">
+            <a:extLst>
+              <a:ext uri="{FF2B5EF4-FFF2-40B4-BE49-F238E27FC236}">
+                <a16:creationId xmlns:a16="http://schemas.microsoft.com/office/drawing/2014/main" id="{5FEC5F46-B4C3-ACA1-896A-73B669A8D2B4}"/>
+              </a:ext>
+            </a:extLst>
+          </p:cNvPr>
+          <p:cNvCxnSpPr>
+            <a:cxnSpLocks/>
+          </p:cNvCxnSpPr>
+          <p:nvPr/>
+        </p:nvCxnSpPr>
+        <p:spPr>
+          <a:xfrm>
+            <a:off x="3625065" y="3336562"/>
+            <a:ext cx="4941869" cy="0"/>
+          </a:xfrm>
+          <a:prstGeom prst="line">
+            <a:avLst/>
+          </a:prstGeom>
+          <a:ln>
+            <a:solidFill>
+              <a:schemeClr val="bg1">
+                <a:lumMod val="85000"/>
+              </a:schemeClr>
+            </a:solidFill>
+          </a:ln>
+        </p:spPr>
+        <p:style>
+          <a:lnRef idx="2">
+            <a:schemeClr val="accent1"/>
+          </a:lnRef>
+          <a:fillRef idx="0">
+            <a:schemeClr val="accent1"/>
+          </a:fillRef>
+          <a:effectRef idx="1">
+            <a:schemeClr val="accent1"/>
+          </a:effectRef>
+          <a:fontRef idx="minor">
+            <a:schemeClr val="tx1"/>
+          </a:fontRef>
+        </p:style>
+      </p:cxnSp>
+      <p:grpSp>
+        <p:nvGrpSpPr>
+          <p:cNvPr id="46" name="Gruppieren 45">
+            <a:extLst>
+              <a:ext uri="{FF2B5EF4-FFF2-40B4-BE49-F238E27FC236}">
+                <a16:creationId xmlns:a16="http://schemas.microsoft.com/office/drawing/2014/main" id="{EB01FABA-DB1A-BD80-F7A0-7AACD8727F93}"/>
+              </a:ext>
+            </a:extLst>
+          </p:cNvPr>
+          <p:cNvGrpSpPr/>
+          <p:nvPr/>
+        </p:nvGrpSpPr>
+        <p:grpSpPr>
+          <a:xfrm>
+            <a:off x="3547519" y="2040532"/>
+            <a:ext cx="5158766" cy="276999"/>
+            <a:chOff x="3563995" y="2254718"/>
+            <a:chExt cx="5158766" cy="276999"/>
+          </a:xfrm>
+        </p:grpSpPr>
+        <p:sp>
+          <p:nvSpPr>
+            <p:cNvPr id="26" name="Textfeld 25">
+              <a:extLst>
+                <a:ext uri="{FF2B5EF4-FFF2-40B4-BE49-F238E27FC236}">
+                  <a16:creationId xmlns:a16="http://schemas.microsoft.com/office/drawing/2014/main" id="{9FF7632F-31A6-D6DC-D954-B145C2D9D7D6}"/>
+                </a:ext>
+              </a:extLst>
+            </p:cNvPr>
+            <p:cNvSpPr txBox="1"/>
+            <p:nvPr/>
+          </p:nvSpPr>
+          <p:spPr>
+            <a:xfrm>
+              <a:off x="3563995" y="2254718"/>
+              <a:ext cx="1387012" cy="276999"/>
+            </a:xfrm>
+            <a:prstGeom prst="rect">
+              <a:avLst/>
+            </a:prstGeom>
+            <a:noFill/>
+          </p:spPr>
+          <p:txBody>
+            <a:bodyPr wrap="square" rtlCol="0">
+              <a:spAutoFit/>
+            </a:bodyPr>
+            <a:lstStyle/>
+            <a:p>
+              <a:r>
+                <a:rPr lang="de-DE" sz="1200" dirty="0">
+                  <a:latin typeface="Roboto Mono" pitchFamily="49" charset="0"/>
+                  <a:ea typeface="Roboto Mono" pitchFamily="49" charset="0"/>
+                </a:rPr>
+                <a:t>MESSAGE-ID: </a:t>
+              </a:r>
+            </a:p>
+          </p:txBody>
+        </p:sp>
+        <p:sp>
+          <p:nvSpPr>
+            <p:cNvPr id="27" name="Textfeld 26">
+              <a:extLst>
+                <a:ext uri="{FF2B5EF4-FFF2-40B4-BE49-F238E27FC236}">
+                  <a16:creationId xmlns:a16="http://schemas.microsoft.com/office/drawing/2014/main" id="{DA92E135-0E8E-2C61-E361-533D8D280612}"/>
+                </a:ext>
+              </a:extLst>
+            </p:cNvPr>
+            <p:cNvSpPr txBox="1"/>
+            <p:nvPr/>
+          </p:nvSpPr>
+          <p:spPr>
+            <a:xfrm>
+              <a:off x="5210758" y="2254718"/>
+              <a:ext cx="3512003" cy="276999"/>
+            </a:xfrm>
+            <a:prstGeom prst="rect">
+              <a:avLst/>
+            </a:prstGeom>
+            <a:noFill/>
+          </p:spPr>
+          <p:txBody>
+            <a:bodyPr wrap="square" rtlCol="0">
+              <a:spAutoFit/>
+            </a:bodyPr>
+            <a:lstStyle/>
+            <a:p>
+              <a:r>
+                <a:rPr lang="de-DE" sz="1200" b="1" dirty="0">
+                  <a:latin typeface="Roboto Mono" pitchFamily="49" charset="0"/>
+                  <a:ea typeface="Roboto Mono" pitchFamily="49" charset="0"/>
+                </a:rPr>
+                <a:t>43001f35-7880-4d94-b7eb-66db69492d6a</a:t>
+              </a:r>
+            </a:p>
+          </p:txBody>
+        </p:sp>
+      </p:grpSp>
+      <p:grpSp>
+        <p:nvGrpSpPr>
+          <p:cNvPr id="48" name="Gruppieren 47">
+            <a:extLst>
+              <a:ext uri="{FF2B5EF4-FFF2-40B4-BE49-F238E27FC236}">
+                <a16:creationId xmlns:a16="http://schemas.microsoft.com/office/drawing/2014/main" id="{4D4C2872-7C4A-2649-7B1C-AE4B5FCCB98F}"/>
+              </a:ext>
+            </a:extLst>
+          </p:cNvPr>
+          <p:cNvGrpSpPr/>
+          <p:nvPr/>
+        </p:nvGrpSpPr>
+        <p:grpSpPr>
+          <a:xfrm>
+            <a:off x="3551123" y="2554975"/>
+            <a:ext cx="4892010" cy="753879"/>
+            <a:chOff x="3625265" y="3024536"/>
+            <a:chExt cx="4892010" cy="753879"/>
+          </a:xfrm>
+        </p:grpSpPr>
+        <p:sp>
+          <p:nvSpPr>
+            <p:cNvPr id="25" name="Textfeld 24">
+              <a:extLst>
+                <a:ext uri="{FF2B5EF4-FFF2-40B4-BE49-F238E27FC236}">
+                  <a16:creationId xmlns:a16="http://schemas.microsoft.com/office/drawing/2014/main" id="{7F7DDA98-639C-C9C6-9FF8-1B10CC3766C1}"/>
+                </a:ext>
+              </a:extLst>
+            </p:cNvPr>
+            <p:cNvSpPr txBox="1"/>
+            <p:nvPr/>
+          </p:nvSpPr>
+          <p:spPr>
+            <a:xfrm>
+              <a:off x="3625265" y="3024536"/>
+              <a:ext cx="1676407" cy="276999"/>
+            </a:xfrm>
+            <a:prstGeom prst="rect">
+              <a:avLst/>
+            </a:prstGeom>
+            <a:noFill/>
+          </p:spPr>
+          <p:txBody>
+            <a:bodyPr wrap="square" rtlCol="0">
+              <a:spAutoFit/>
+            </a:bodyPr>
+            <a:lstStyle/>
+            <a:p>
+              <a:r>
+                <a:rPr lang="de-DE" sz="1200" dirty="0">
+                  <a:latin typeface="Roboto Mono" pitchFamily="49" charset="0"/>
+                  <a:ea typeface="Roboto Mono" pitchFamily="49" charset="0"/>
+                </a:rPr>
+                <a:t>MESSAGE : </a:t>
+              </a:r>
+            </a:p>
+          </p:txBody>
+        </p:sp>
+        <p:sp>
+          <p:nvSpPr>
+            <p:cNvPr id="28" name="Textfeld 27">
+              <a:extLst>
+                <a:ext uri="{FF2B5EF4-FFF2-40B4-BE49-F238E27FC236}">
+                  <a16:creationId xmlns:a16="http://schemas.microsoft.com/office/drawing/2014/main" id="{CFC316B4-E153-919F-089E-20BDC8483331}"/>
+                </a:ext>
+              </a:extLst>
+            </p:cNvPr>
+            <p:cNvSpPr txBox="1"/>
+            <p:nvPr/>
+          </p:nvSpPr>
+          <p:spPr>
+            <a:xfrm>
+              <a:off x="3643610" y="3316750"/>
+              <a:ext cx="4873665" cy="461665"/>
+            </a:xfrm>
+            <a:prstGeom prst="rect">
+              <a:avLst/>
+            </a:prstGeom>
+            <a:noFill/>
+          </p:spPr>
+          <p:txBody>
+            <a:bodyPr wrap="square" rtlCol="0">
+              <a:spAutoFit/>
+            </a:bodyPr>
+            <a:lstStyle/>
+            <a:p>
+              <a:r>
+                <a:rPr lang="de-DE" sz="1200" b="1" dirty="0" err="1">
+                  <a:latin typeface="Roboto Mono" pitchFamily="49" charset="0"/>
+                  <a:ea typeface="Roboto Mono" pitchFamily="49" charset="0"/>
+                </a:rPr>
+                <a:t>Bumble</a:t>
+              </a:r>
+              <a:r>
+                <a:rPr lang="de-DE" sz="1200" b="1" dirty="0">
+                  <a:latin typeface="Roboto Mono" pitchFamily="49" charset="0"/>
+                  <a:ea typeface="Roboto Mono" pitchFamily="49" charset="0"/>
+                </a:rPr>
+                <a:t> </a:t>
+              </a:r>
+              <a:r>
+                <a:rPr lang="de-DE" sz="1200" b="1" dirty="0" err="1">
+                  <a:latin typeface="Roboto Mono" pitchFamily="49" charset="0"/>
+                  <a:ea typeface="Roboto Mono" pitchFamily="49" charset="0"/>
+                </a:rPr>
+                <a:t>bees</a:t>
+              </a:r>
+              <a:r>
+                <a:rPr lang="de-DE" sz="1200" b="1" dirty="0">
+                  <a:latin typeface="Roboto Mono" pitchFamily="49" charset="0"/>
+                  <a:ea typeface="Roboto Mono" pitchFamily="49" charset="0"/>
+                </a:rPr>
+                <a:t> </a:t>
+              </a:r>
+              <a:r>
+                <a:rPr lang="de-DE" sz="1200" b="1" dirty="0" err="1">
+                  <a:latin typeface="Roboto Mono" pitchFamily="49" charset="0"/>
+                  <a:ea typeface="Roboto Mono" pitchFamily="49" charset="0"/>
+                </a:rPr>
+                <a:t>are</a:t>
+              </a:r>
+              <a:r>
+                <a:rPr lang="de-DE" sz="1200" b="1" dirty="0">
+                  <a:latin typeface="Roboto Mono" pitchFamily="49" charset="0"/>
+                  <a:ea typeface="Roboto Mono" pitchFamily="49" charset="0"/>
+                </a:rPr>
+                <a:t> </a:t>
+              </a:r>
+              <a:r>
+                <a:rPr lang="de-DE" sz="1200" b="1" dirty="0" err="1">
+                  <a:latin typeface="Roboto Mono" pitchFamily="49" charset="0"/>
+                  <a:ea typeface="Roboto Mono" pitchFamily="49" charset="0"/>
+                </a:rPr>
+                <a:t>very</a:t>
+              </a:r>
+              <a:r>
+                <a:rPr lang="de-DE" sz="1200" b="1" dirty="0">
+                  <a:latin typeface="Roboto Mono" pitchFamily="49" charset="0"/>
+                  <a:ea typeface="Roboto Mono" pitchFamily="49" charset="0"/>
+                </a:rPr>
+                <a:t> </a:t>
+              </a:r>
+              <a:r>
+                <a:rPr lang="de-DE" sz="1200" b="1" dirty="0" err="1">
+                  <a:latin typeface="Roboto Mono" pitchFamily="49" charset="0"/>
+                  <a:ea typeface="Roboto Mono" pitchFamily="49" charset="0"/>
+                </a:rPr>
+                <a:t>beautiful</a:t>
+              </a:r>
+              <a:r>
+                <a:rPr lang="de-DE" sz="1200" b="1" dirty="0">
+                  <a:latin typeface="Roboto Mono" pitchFamily="49" charset="0"/>
+                  <a:ea typeface="Roboto Mono" pitchFamily="49" charset="0"/>
+                </a:rPr>
+                <a:t> </a:t>
+              </a:r>
+              <a:r>
+                <a:rPr lang="de-DE" sz="1200" b="1" dirty="0" err="1">
+                  <a:latin typeface="Roboto Mono" pitchFamily="49" charset="0"/>
+                  <a:ea typeface="Roboto Mono" pitchFamily="49" charset="0"/>
+                </a:rPr>
+                <a:t>creatures</a:t>
+              </a:r>
+              <a:r>
+                <a:rPr lang="de-DE" sz="1200" b="1" dirty="0">
+                  <a:latin typeface="Roboto Mono" pitchFamily="49" charset="0"/>
+                  <a:ea typeface="Roboto Mono" pitchFamily="49" charset="0"/>
+                </a:rPr>
+                <a:t> </a:t>
+              </a:r>
+              <a:r>
+                <a:rPr lang="de-DE" sz="1200" b="1" dirty="0" err="1">
+                  <a:latin typeface="Roboto Mono" pitchFamily="49" charset="0"/>
+                  <a:ea typeface="Roboto Mono" pitchFamily="49" charset="0"/>
+                </a:rPr>
+                <a:t>that</a:t>
+              </a:r>
+              <a:r>
+                <a:rPr lang="de-DE" sz="1200" b="1" dirty="0">
+                  <a:latin typeface="Roboto Mono" pitchFamily="49" charset="0"/>
+                  <a:ea typeface="Roboto Mono" pitchFamily="49" charset="0"/>
+                </a:rPr>
+                <a:t> </a:t>
+              </a:r>
+              <a:r>
+                <a:rPr lang="de-DE" sz="1200" b="1" dirty="0" err="1">
+                  <a:latin typeface="Roboto Mono" pitchFamily="49" charset="0"/>
+                  <a:ea typeface="Roboto Mono" pitchFamily="49" charset="0"/>
+                </a:rPr>
+                <a:t>fly</a:t>
+              </a:r>
+              <a:r>
+                <a:rPr lang="de-DE" sz="1200" b="1" dirty="0">
+                  <a:latin typeface="Roboto Mono" pitchFamily="49" charset="0"/>
+                  <a:ea typeface="Roboto Mono" pitchFamily="49" charset="0"/>
+                </a:rPr>
+                <a:t> </a:t>
+              </a:r>
+              <a:r>
+                <a:rPr lang="de-DE" sz="1200" b="1" dirty="0" err="1">
+                  <a:latin typeface="Roboto Mono" pitchFamily="49" charset="0"/>
+                  <a:ea typeface="Roboto Mono" pitchFamily="49" charset="0"/>
+                </a:rPr>
+                <a:t>around</a:t>
+              </a:r>
+              <a:r>
+                <a:rPr lang="de-DE" sz="1200" b="1" dirty="0">
+                  <a:latin typeface="Roboto Mono" pitchFamily="49" charset="0"/>
+                  <a:ea typeface="Roboto Mono" pitchFamily="49" charset="0"/>
+                </a:rPr>
+                <a:t> and </a:t>
+              </a:r>
+              <a:r>
+                <a:rPr lang="de-DE" sz="1200" b="1" dirty="0" err="1">
+                  <a:latin typeface="Roboto Mono" pitchFamily="49" charset="0"/>
+                  <a:ea typeface="Roboto Mono" pitchFamily="49" charset="0"/>
+                </a:rPr>
+                <a:t>make</a:t>
+              </a:r>
+              <a:r>
+                <a:rPr lang="de-DE" sz="1200" b="1" dirty="0">
+                  <a:latin typeface="Roboto Mono" pitchFamily="49" charset="0"/>
+                  <a:ea typeface="Roboto Mono" pitchFamily="49" charset="0"/>
+                </a:rPr>
+                <a:t> a </a:t>
+              </a:r>
+              <a:r>
+                <a:rPr lang="de-DE" sz="1200" b="1" dirty="0" err="1">
+                  <a:latin typeface="Roboto Mono" pitchFamily="49" charset="0"/>
+                  <a:ea typeface="Roboto Mono" pitchFamily="49" charset="0"/>
+                </a:rPr>
+                <a:t>buzzing</a:t>
+              </a:r>
+              <a:r>
+                <a:rPr lang="de-DE" sz="1200" b="1" dirty="0">
+                  <a:latin typeface="Roboto Mono" pitchFamily="49" charset="0"/>
+                  <a:ea typeface="Roboto Mono" pitchFamily="49" charset="0"/>
+                </a:rPr>
+                <a:t> </a:t>
+              </a:r>
+              <a:r>
+                <a:rPr lang="de-DE" sz="1200" b="1" dirty="0" err="1">
+                  <a:latin typeface="Roboto Mono" pitchFamily="49" charset="0"/>
+                  <a:ea typeface="Roboto Mono" pitchFamily="49" charset="0"/>
+                </a:rPr>
+                <a:t>noise</a:t>
+              </a:r>
+              <a:r>
+                <a:rPr lang="de-DE" sz="1200" b="1" dirty="0">
+                  <a:latin typeface="Roboto Mono" pitchFamily="49" charset="0"/>
+                  <a:ea typeface="Roboto Mono" pitchFamily="49" charset="0"/>
+                </a:rPr>
+                <a:t>.</a:t>
+              </a:r>
+            </a:p>
+          </p:txBody>
+        </p:sp>
+      </p:grpSp>
+      <p:grpSp>
+        <p:nvGrpSpPr>
+          <p:cNvPr id="49" name="Gruppieren 48">
+            <a:extLst>
+              <a:ext uri="{FF2B5EF4-FFF2-40B4-BE49-F238E27FC236}">
+                <a16:creationId xmlns:a16="http://schemas.microsoft.com/office/drawing/2014/main" id="{FFF854A5-B169-75A4-F9DB-31C86C0AD000}"/>
+              </a:ext>
+            </a:extLst>
+          </p:cNvPr>
+          <p:cNvGrpSpPr/>
+          <p:nvPr/>
+        </p:nvGrpSpPr>
+        <p:grpSpPr>
+          <a:xfrm>
+            <a:off x="3575012" y="3385216"/>
+            <a:ext cx="4908161" cy="2364917"/>
+            <a:chOff x="3640916" y="3970107"/>
+            <a:chExt cx="4908161" cy="2364917"/>
+          </a:xfrm>
+        </p:grpSpPr>
+        <p:sp>
+          <p:nvSpPr>
+            <p:cNvPr id="29" name="Textfeld 28">
+              <a:extLst>
+                <a:ext uri="{FF2B5EF4-FFF2-40B4-BE49-F238E27FC236}">
+                  <a16:creationId xmlns:a16="http://schemas.microsoft.com/office/drawing/2014/main" id="{905397C4-B227-79CF-ADA3-FE1FBBE4E6B3}"/>
+                </a:ext>
+              </a:extLst>
+            </p:cNvPr>
+            <p:cNvSpPr txBox="1"/>
+            <p:nvPr/>
+          </p:nvSpPr>
+          <p:spPr>
+            <a:xfrm>
+              <a:off x="3643610" y="3970107"/>
+              <a:ext cx="1676407" cy="276999"/>
+            </a:xfrm>
+            <a:prstGeom prst="rect">
+              <a:avLst/>
+            </a:prstGeom>
+            <a:noFill/>
+          </p:spPr>
+          <p:txBody>
+            <a:bodyPr wrap="square" rtlCol="0">
+              <a:spAutoFit/>
+            </a:bodyPr>
+            <a:lstStyle/>
+            <a:p>
+              <a:r>
+                <a:rPr lang="de-DE" sz="1200" dirty="0">
+                  <a:latin typeface="Roboto Mono" pitchFamily="49" charset="0"/>
+                  <a:ea typeface="Roboto Mono" pitchFamily="49" charset="0"/>
+                </a:rPr>
+                <a:t>MESSAGE CONTEXT: </a:t>
+              </a:r>
+            </a:p>
+          </p:txBody>
+        </p:sp>
+        <p:sp>
+          <p:nvSpPr>
+            <p:cNvPr id="31" name="Textfeld 30">
+              <a:extLst>
+                <a:ext uri="{FF2B5EF4-FFF2-40B4-BE49-F238E27FC236}">
+                  <a16:creationId xmlns:a16="http://schemas.microsoft.com/office/drawing/2014/main" id="{9EBA437F-4140-5567-1864-2C9FD95D6B53}"/>
+                </a:ext>
+              </a:extLst>
+            </p:cNvPr>
+            <p:cNvSpPr txBox="1"/>
+            <p:nvPr/>
+          </p:nvSpPr>
+          <p:spPr>
+            <a:xfrm>
+              <a:off x="3640916" y="4186747"/>
+              <a:ext cx="1676407" cy="276999"/>
+            </a:xfrm>
+            <a:prstGeom prst="rect">
+              <a:avLst/>
+            </a:prstGeom>
+            <a:noFill/>
+          </p:spPr>
+          <p:txBody>
+            <a:bodyPr wrap="square" rtlCol="0">
+              <a:spAutoFit/>
+            </a:bodyPr>
+            <a:lstStyle/>
+            <a:p>
+              <a:r>
+                <a:rPr lang="de-DE" sz="1200" dirty="0">
+                  <a:latin typeface="Roboto Mono" pitchFamily="49" charset="0"/>
+                  <a:ea typeface="Roboto Mono" pitchFamily="49" charset="0"/>
+                </a:rPr>
+                <a:t>FUNCTION: </a:t>
+              </a:r>
+            </a:p>
+          </p:txBody>
+        </p:sp>
+        <p:sp>
+          <p:nvSpPr>
+            <p:cNvPr id="32" name="Textfeld 31">
+              <a:extLst>
+                <a:ext uri="{FF2B5EF4-FFF2-40B4-BE49-F238E27FC236}">
+                  <a16:creationId xmlns:a16="http://schemas.microsoft.com/office/drawing/2014/main" id="{FA409619-67D1-BA9A-3729-0C08AC6ADEC4}"/>
+                </a:ext>
+              </a:extLst>
+            </p:cNvPr>
+            <p:cNvSpPr txBox="1"/>
+            <p:nvPr/>
+          </p:nvSpPr>
+          <p:spPr>
+            <a:xfrm>
+              <a:off x="5238021" y="4186747"/>
+              <a:ext cx="3279254" cy="276999"/>
+            </a:xfrm>
+            <a:prstGeom prst="rect">
+              <a:avLst/>
+            </a:prstGeom>
+            <a:noFill/>
+          </p:spPr>
+          <p:txBody>
+            <a:bodyPr wrap="square" rtlCol="0">
+              <a:spAutoFit/>
+            </a:bodyPr>
+            <a:lstStyle/>
+            <a:p>
+              <a:r>
+                <a:rPr lang="de-DE" sz="1200" b="1" dirty="0">
+                  <a:latin typeface="Roboto Mono" pitchFamily="49" charset="0"/>
+                  <a:ea typeface="Roboto Mono" pitchFamily="49" charset="0"/>
+                </a:rPr>
+                <a:t>#‘</a:t>
+              </a:r>
+              <a:r>
+                <a:rPr lang="de-DE" sz="1200" b="1" dirty="0" err="1">
+                  <a:latin typeface="Roboto Mono" pitchFamily="49" charset="0"/>
+                  <a:ea typeface="Roboto Mono" pitchFamily="49" charset="0"/>
+                </a:rPr>
+                <a:t>my</a:t>
+              </a:r>
+              <a:r>
+                <a:rPr lang="de-DE" sz="1200" b="1" dirty="0">
+                  <a:latin typeface="Roboto Mono" pitchFamily="49" charset="0"/>
+                  <a:ea typeface="Roboto Mono" pitchFamily="49" charset="0"/>
+                </a:rPr>
+                <a:t>-super-</a:t>
+              </a:r>
+              <a:r>
+                <a:rPr lang="de-DE" sz="1200" b="1" dirty="0" err="1">
+                  <a:latin typeface="Roboto Mono" pitchFamily="49" charset="0"/>
+                  <a:ea typeface="Roboto Mono" pitchFamily="49" charset="0"/>
+                </a:rPr>
+                <a:t>duper</a:t>
+              </a:r>
+              <a:r>
+                <a:rPr lang="de-DE" sz="1200" b="1" dirty="0">
+                  <a:latin typeface="Roboto Mono" pitchFamily="49" charset="0"/>
+                  <a:ea typeface="Roboto Mono" pitchFamily="49" charset="0"/>
+                </a:rPr>
+                <a:t>-</a:t>
+              </a:r>
+              <a:r>
+                <a:rPr lang="de-DE" sz="1200" b="1" dirty="0" err="1">
+                  <a:latin typeface="Roboto Mono" pitchFamily="49" charset="0"/>
+                  <a:ea typeface="Roboto Mono" pitchFamily="49" charset="0"/>
+                </a:rPr>
+                <a:t>function</a:t>
+              </a:r>
+              <a:endParaRPr lang="de-DE" sz="1200" b="1" dirty="0">
+                <a:latin typeface="Roboto Mono" pitchFamily="49" charset="0"/>
+                <a:ea typeface="Roboto Mono" pitchFamily="49" charset="0"/>
+              </a:endParaRPr>
+            </a:p>
+          </p:txBody>
+        </p:sp>
+        <p:sp>
+          <p:nvSpPr>
+            <p:cNvPr id="33" name="Textfeld 32">
+              <a:extLst>
+                <a:ext uri="{FF2B5EF4-FFF2-40B4-BE49-F238E27FC236}">
+                  <a16:creationId xmlns:a16="http://schemas.microsoft.com/office/drawing/2014/main" id="{435D8EE9-D857-CD0D-CDAA-8E8373074DB7}"/>
+                </a:ext>
+              </a:extLst>
+            </p:cNvPr>
+            <p:cNvSpPr txBox="1"/>
+            <p:nvPr/>
+          </p:nvSpPr>
+          <p:spPr>
+            <a:xfrm>
+              <a:off x="3640916" y="4405280"/>
+              <a:ext cx="1676407" cy="276999"/>
+            </a:xfrm>
+            <a:prstGeom prst="rect">
+              <a:avLst/>
+            </a:prstGeom>
+            <a:noFill/>
+          </p:spPr>
+          <p:txBody>
+            <a:bodyPr wrap="square" rtlCol="0">
+              <a:spAutoFit/>
+            </a:bodyPr>
+            <a:lstStyle/>
+            <a:p>
+              <a:r>
+                <a:rPr lang="de-DE" sz="1200" dirty="0">
+                  <a:latin typeface="Roboto Mono" pitchFamily="49" charset="0"/>
+                  <a:ea typeface="Roboto Mono" pitchFamily="49" charset="0"/>
+                </a:rPr>
+                <a:t>FILE : </a:t>
+              </a:r>
+            </a:p>
+          </p:txBody>
+        </p:sp>
+        <p:sp>
+          <p:nvSpPr>
+            <p:cNvPr id="34" name="Textfeld 33">
+              <a:extLst>
+                <a:ext uri="{FF2B5EF4-FFF2-40B4-BE49-F238E27FC236}">
+                  <a16:creationId xmlns:a16="http://schemas.microsoft.com/office/drawing/2014/main" id="{EF4CDCC1-747F-8512-8EB5-47F2F5AEB959}"/>
+                </a:ext>
+              </a:extLst>
+            </p:cNvPr>
+            <p:cNvSpPr txBox="1"/>
+            <p:nvPr/>
+          </p:nvSpPr>
+          <p:spPr>
+            <a:xfrm>
+              <a:off x="5238021" y="4405280"/>
+              <a:ext cx="1672046" cy="276999"/>
+            </a:xfrm>
+            <a:prstGeom prst="rect">
+              <a:avLst/>
+            </a:prstGeom>
+            <a:noFill/>
+          </p:spPr>
+          <p:txBody>
+            <a:bodyPr wrap="square" rtlCol="0">
+              <a:spAutoFit/>
+            </a:bodyPr>
+            <a:lstStyle/>
+            <a:p>
+              <a:r>
+                <a:rPr lang="de-DE" sz="1200" b="1" dirty="0" err="1">
+                  <a:latin typeface="Roboto Mono" pitchFamily="49" charset="0"/>
+                  <a:ea typeface="Roboto Mono" pitchFamily="49" charset="0"/>
+                </a:rPr>
+                <a:t>Halleluja.lisp</a:t>
+              </a:r>
+              <a:endParaRPr lang="de-DE" sz="1200" b="1" dirty="0">
+                <a:latin typeface="Roboto Mono" pitchFamily="49" charset="0"/>
+                <a:ea typeface="Roboto Mono" pitchFamily="49" charset="0"/>
+              </a:endParaRPr>
+            </a:p>
+          </p:txBody>
+        </p:sp>
+        <p:sp>
+          <p:nvSpPr>
+            <p:cNvPr id="37" name="Textfeld 36">
+              <a:extLst>
+                <a:ext uri="{FF2B5EF4-FFF2-40B4-BE49-F238E27FC236}">
+                  <a16:creationId xmlns:a16="http://schemas.microsoft.com/office/drawing/2014/main" id="{0FF789ED-5BE2-00A4-4AC6-67221A68FD2D}"/>
+                </a:ext>
+              </a:extLst>
+            </p:cNvPr>
+            <p:cNvSpPr txBox="1"/>
+            <p:nvPr/>
+          </p:nvSpPr>
+          <p:spPr>
+            <a:xfrm>
+              <a:off x="3640916" y="4618864"/>
+              <a:ext cx="1676407" cy="276999"/>
+            </a:xfrm>
+            <a:prstGeom prst="rect">
+              <a:avLst/>
+            </a:prstGeom>
+            <a:noFill/>
+          </p:spPr>
+          <p:txBody>
+            <a:bodyPr wrap="square" rtlCol="0">
+              <a:spAutoFit/>
+            </a:bodyPr>
+            <a:lstStyle/>
+            <a:p>
+              <a:r>
+                <a:rPr lang="de-DE" sz="1200" dirty="0">
+                  <a:latin typeface="Roboto Mono" pitchFamily="49" charset="0"/>
+                  <a:ea typeface="Roboto Mono" pitchFamily="49" charset="0"/>
+                </a:rPr>
+                <a:t>BACKTRACE : </a:t>
+              </a:r>
+            </a:p>
+          </p:txBody>
+        </p:sp>
+        <p:sp>
+          <p:nvSpPr>
+            <p:cNvPr id="38" name="Textfeld 37">
+              <a:extLst>
+                <a:ext uri="{FF2B5EF4-FFF2-40B4-BE49-F238E27FC236}">
+                  <a16:creationId xmlns:a16="http://schemas.microsoft.com/office/drawing/2014/main" id="{A2BF4E38-0AE6-7B66-222B-66FD4AFEDB7B}"/>
+                </a:ext>
+              </a:extLst>
+            </p:cNvPr>
+            <p:cNvSpPr txBox="1"/>
+            <p:nvPr/>
+          </p:nvSpPr>
+          <p:spPr>
+            <a:xfrm>
+              <a:off x="3675412" y="4950029"/>
+              <a:ext cx="4873665" cy="1384995"/>
+            </a:xfrm>
+            <a:prstGeom prst="rect">
+              <a:avLst/>
+            </a:prstGeom>
+            <a:noFill/>
+          </p:spPr>
+          <p:txBody>
+            <a:bodyPr wrap="square" rtlCol="0">
+              <a:spAutoFit/>
+            </a:bodyPr>
+            <a:lstStyle/>
+            <a:p>
+              <a:r>
+                <a:rPr lang="de-DE" sz="1200" b="1" dirty="0">
+                  <a:latin typeface="Roboto Mono" pitchFamily="49" charset="0"/>
+                  <a:ea typeface="Roboto Mono" pitchFamily="49" charset="0"/>
+                </a:rPr>
+                <a:t> 0: (ERROR #&lt;UNDEFINED-FUNCTION @ #x100078903a2&gt;)</a:t>
+              </a:r>
+            </a:p>
+            <a:p>
+              <a:r>
+                <a:rPr lang="de-DE" sz="1200" b="1" dirty="0">
+                  <a:latin typeface="Roboto Mono" pitchFamily="49" charset="0"/>
+                  <a:ea typeface="Roboto Mono" pitchFamily="49" charset="0"/>
+                </a:rPr>
+                <a:t> 1: (EVAL (BACKTRACE))</a:t>
+              </a:r>
+            </a:p>
+            <a:p>
+              <a:r>
+                <a:rPr lang="de-DE" sz="1200" b="1" dirty="0">
+                  <a:latin typeface="Roboto Mono" pitchFamily="49" charset="0"/>
+                  <a:ea typeface="Roboto Mono" pitchFamily="49" charset="0"/>
+                </a:rPr>
+                <a:t> 2: (SWANK::EVAL-REGION "(</a:t>
+              </a:r>
+              <a:r>
+                <a:rPr lang="de-DE" sz="1200" b="1" dirty="0" err="1">
+                  <a:latin typeface="Roboto Mono" pitchFamily="49" charset="0"/>
+                  <a:ea typeface="Roboto Mono" pitchFamily="49" charset="0"/>
+                </a:rPr>
+                <a:t>backtrace</a:t>
+              </a:r>
+              <a:r>
+                <a:rPr lang="de-DE" sz="1200" b="1" dirty="0">
+                  <a:latin typeface="Roboto Mono" pitchFamily="49" charset="0"/>
+                  <a:ea typeface="Roboto Mono" pitchFamily="49" charset="0"/>
+                </a:rPr>
+                <a:t>)\</a:t>
+              </a:r>
+              <a:r>
+                <a:rPr lang="de-DE" sz="1200" b="1" dirty="0" err="1">
+                  <a:latin typeface="Roboto Mono" pitchFamily="49" charset="0"/>
+                  <a:ea typeface="Roboto Mono" pitchFamily="49" charset="0"/>
+                </a:rPr>
+                <a:t>n</a:t>
+              </a:r>
+              <a:r>
+                <a:rPr lang="de-DE" sz="1200" b="1" dirty="0">
+                  <a:latin typeface="Roboto Mono" pitchFamily="49" charset="0"/>
+                  <a:ea typeface="Roboto Mono" pitchFamily="49" charset="0"/>
+                </a:rPr>
+                <a:t>")</a:t>
+              </a:r>
+            </a:p>
+            <a:p>
+              <a:r>
+                <a:rPr lang="de-DE" sz="1200" b="1" dirty="0">
+                  <a:latin typeface="Roboto Mono" pitchFamily="49" charset="0"/>
+                  <a:ea typeface="Roboto Mono" pitchFamily="49" charset="0"/>
+                </a:rPr>
+                <a:t> 3: ((:INTERNAL (:INTERNAL (:INTERNAL SWANK-REPL::REPL-EVAL 0) 0) 0))</a:t>
+              </a:r>
+            </a:p>
+            <a:p>
+              <a:r>
+                <a:rPr lang="de-DE" sz="1200" b="1" dirty="0">
+                  <a:latin typeface="Roboto Mono" pitchFamily="49" charset="0"/>
+                  <a:ea typeface="Roboto Mono" pitchFamily="49" charset="0"/>
+                </a:rPr>
+                <a:t> 4: (SWANK-REPL::TRACK-PACKAGE #&lt;</a:t>
+              </a:r>
+              <a:r>
+                <a:rPr lang="de-DE" sz="1200" b="1" dirty="0" err="1">
+                  <a:latin typeface="Roboto Mono" pitchFamily="49" charset="0"/>
+                  <a:ea typeface="Roboto Mono" pitchFamily="49" charset="0"/>
+                </a:rPr>
+                <a:t>Closure</a:t>
+              </a:r>
+              <a:r>
+                <a:rPr lang="de-DE" sz="1200" b="1" dirty="0">
+                  <a:latin typeface="Roboto Mono" pitchFamily="49" charset="0"/>
+                  <a:ea typeface="Roboto Mono" pitchFamily="49" charset="0"/>
+                </a:rPr>
+                <a:t> (:INTERNAL (:INTERNAL # 0) 0) </a:t>
+              </a:r>
+            </a:p>
+          </p:txBody>
+        </p:sp>
+      </p:grpSp>
+      <p:grpSp>
+        <p:nvGrpSpPr>
+          <p:cNvPr id="42" name="Gruppieren 41">
+            <a:extLst>
+              <a:ext uri="{FF2B5EF4-FFF2-40B4-BE49-F238E27FC236}">
+                <a16:creationId xmlns:a16="http://schemas.microsoft.com/office/drawing/2014/main" id="{1DB9B733-2812-B78A-2808-5CA0297F6435}"/>
+              </a:ext>
+            </a:extLst>
+          </p:cNvPr>
+          <p:cNvGrpSpPr/>
+          <p:nvPr/>
+        </p:nvGrpSpPr>
+        <p:grpSpPr>
+          <a:xfrm>
+            <a:off x="3563995" y="1361433"/>
+            <a:ext cx="3824405" cy="276999"/>
+            <a:chOff x="3563995" y="1622226"/>
+            <a:chExt cx="3824405" cy="276999"/>
+          </a:xfrm>
+        </p:grpSpPr>
+        <p:sp>
+          <p:nvSpPr>
+            <p:cNvPr id="43" name="Textfeld 42">
+              <a:extLst>
+                <a:ext uri="{FF2B5EF4-FFF2-40B4-BE49-F238E27FC236}">
+                  <a16:creationId xmlns:a16="http://schemas.microsoft.com/office/drawing/2014/main" id="{6BE3D5BA-27A3-3278-241E-E0EB12CD9DC1}"/>
+                </a:ext>
+              </a:extLst>
+            </p:cNvPr>
+            <p:cNvSpPr txBox="1"/>
+            <p:nvPr/>
+          </p:nvSpPr>
+          <p:spPr>
+            <a:xfrm>
+              <a:off x="3563995" y="1622226"/>
+              <a:ext cx="1674026" cy="276999"/>
+            </a:xfrm>
+            <a:prstGeom prst="rect">
+              <a:avLst/>
+            </a:prstGeom>
+            <a:noFill/>
+          </p:spPr>
+          <p:txBody>
+            <a:bodyPr wrap="square" rtlCol="0">
+              <a:spAutoFit/>
+            </a:bodyPr>
+            <a:lstStyle/>
+            <a:p>
+              <a:r>
+                <a:rPr lang="de-DE" sz="1200" dirty="0">
+                  <a:latin typeface="Roboto Mono" pitchFamily="49" charset="0"/>
+                  <a:ea typeface="Roboto Mono" pitchFamily="49" charset="0"/>
+                </a:rPr>
+                <a:t>DEVICE ID: </a:t>
+              </a:r>
+            </a:p>
+          </p:txBody>
+        </p:sp>
+        <p:sp>
+          <p:nvSpPr>
+            <p:cNvPr id="44" name="Textfeld 43">
+              <a:extLst>
+                <a:ext uri="{FF2B5EF4-FFF2-40B4-BE49-F238E27FC236}">
+                  <a16:creationId xmlns:a16="http://schemas.microsoft.com/office/drawing/2014/main" id="{052BE034-1F4C-63B6-753E-0D89A657155F}"/>
+                </a:ext>
+              </a:extLst>
+            </p:cNvPr>
+            <p:cNvSpPr txBox="1"/>
+            <p:nvPr/>
+          </p:nvSpPr>
+          <p:spPr>
+            <a:xfrm>
+              <a:off x="5210758" y="1622226"/>
+              <a:ext cx="2177642" cy="276999"/>
+            </a:xfrm>
+            <a:prstGeom prst="rect">
+              <a:avLst/>
+            </a:prstGeom>
+            <a:noFill/>
+          </p:spPr>
+          <p:txBody>
+            <a:bodyPr wrap="square" rtlCol="0">
+              <a:spAutoFit/>
+            </a:bodyPr>
+            <a:lstStyle/>
+            <a:p>
+              <a:r>
+                <a:rPr lang="de-DE" sz="1200" b="1" dirty="0">
+                  <a:latin typeface="Roboto Mono" pitchFamily="49" charset="0"/>
+                  <a:ea typeface="Roboto Mono" pitchFamily="49" charset="0"/>
+                </a:rPr>
+                <a:t>ADT-200A DG1SBG</a:t>
+              </a:r>
+            </a:p>
+          </p:txBody>
+        </p:sp>
+      </p:grpSp>
+      <p:sp>
+        <p:nvSpPr>
+          <p:cNvPr id="50" name="Textfeld 49">
+            <a:extLst>
+              <a:ext uri="{FF2B5EF4-FFF2-40B4-BE49-F238E27FC236}">
+                <a16:creationId xmlns:a16="http://schemas.microsoft.com/office/drawing/2014/main" id="{01B1C6E9-7523-D253-F344-52D5B90F5F61}"/>
+              </a:ext>
+            </a:extLst>
+          </p:cNvPr>
+          <p:cNvSpPr txBox="1"/>
+          <p:nvPr/>
+        </p:nvSpPr>
+        <p:spPr>
+          <a:xfrm>
+            <a:off x="7428146" y="3842238"/>
+            <a:ext cx="665082" cy="276999"/>
           </a:xfrm>
           <a:prstGeom prst="rect">
             <a:avLst/>
@@ -3456,17 +5067,17 @@
                 <a:latin typeface="Roboto Mono" pitchFamily="49" charset="0"/>
                 <a:ea typeface="Roboto Mono" pitchFamily="49" charset="0"/>
               </a:rPr>
-              <a:t>Domain: </a:t>
-            </a:r>
-          </a:p>
-        </p:txBody>
-      </p:sp>
-      <p:sp>
-        <p:nvSpPr>
-          <p:cNvPr id="7" name="Textfeld 6">
-            <a:extLst>
-              <a:ext uri="{FF2B5EF4-FFF2-40B4-BE49-F238E27FC236}">
-                <a16:creationId xmlns:a16="http://schemas.microsoft.com/office/drawing/2014/main" id="{420CB4B8-8BF2-89D0-51FB-EE25779A1C4B}"/>
+              <a:t>LINE: </a:t>
+            </a:r>
+          </a:p>
+        </p:txBody>
+      </p:sp>
+      <p:sp>
+        <p:nvSpPr>
+          <p:cNvPr id="51" name="Textfeld 50">
+            <a:extLst>
+              <a:ext uri="{FF2B5EF4-FFF2-40B4-BE49-F238E27FC236}">
+                <a16:creationId xmlns:a16="http://schemas.microsoft.com/office/drawing/2014/main" id="{76C87686-6D87-754C-8421-E9312C1B07AE}"/>
               </a:ext>
             </a:extLst>
           </p:cNvPr>
@@ -3475,8 +5086,8 @@
         </p:nvSpPr>
         <p:spPr>
           <a:xfrm>
-            <a:off x="5149066" y="1550947"/>
-            <a:ext cx="3460678" cy="276999"/>
+            <a:off x="7961632" y="3842238"/>
+            <a:ext cx="979477" cy="276999"/>
           </a:xfrm>
           <a:prstGeom prst="rect">
             <a:avLst/>
@@ -3490,28 +5101,168 @@
           <a:lstStyle/>
           <a:p>
             <a:r>
-              <a:rPr lang="de-DE" sz="1200" b="1" dirty="0" err="1">
-                <a:latin typeface="Roboto Mono" pitchFamily="49" charset="0"/>
-                <a:ea typeface="Roboto Mono" pitchFamily="49" charset="0"/>
-              </a:rPr>
-              <a:t>ThingBone</a:t>
-            </a:r>
-            <a:r>
               <a:rPr lang="de-DE" sz="1200" b="1" dirty="0">
                 <a:latin typeface="Roboto Mono" pitchFamily="49" charset="0"/>
                 <a:ea typeface="Roboto Mono" pitchFamily="49" charset="0"/>
               </a:rPr>
-              <a:t>/GOEDETBD01/adt200a-dg1sbg</a:t>
-            </a:r>
-          </a:p>
-        </p:txBody>
-      </p:sp>
-      <p:sp>
-        <p:nvSpPr>
-          <p:cNvPr id="8" name="Textfeld 7">
-            <a:extLst>
-              <a:ext uri="{FF2B5EF4-FFF2-40B4-BE49-F238E27FC236}">
-                <a16:creationId xmlns:a16="http://schemas.microsoft.com/office/drawing/2014/main" id="{90E6C3BC-5333-5DCC-E2F4-97E0CB444647}"/>
+              <a:t>1024</a:t>
+            </a:r>
+          </a:p>
+        </p:txBody>
+      </p:sp>
+      <p:cxnSp>
+        <p:nvCxnSpPr>
+          <p:cNvPr id="52" name="Gerade Verbindung 51">
+            <a:extLst>
+              <a:ext uri="{FF2B5EF4-FFF2-40B4-BE49-F238E27FC236}">
+                <a16:creationId xmlns:a16="http://schemas.microsoft.com/office/drawing/2014/main" id="{6EDB905D-6879-9E1E-D913-4FF642C18BCD}"/>
+              </a:ext>
+            </a:extLst>
+          </p:cNvPr>
+          <p:cNvCxnSpPr>
+            <a:cxnSpLocks/>
+          </p:cNvCxnSpPr>
+          <p:nvPr/>
+        </p:nvCxnSpPr>
+        <p:spPr>
+          <a:xfrm>
+            <a:off x="3631916" y="5821515"/>
+            <a:ext cx="4941869" cy="0"/>
+          </a:xfrm>
+          <a:prstGeom prst="line">
+            <a:avLst/>
+          </a:prstGeom>
+          <a:ln>
+            <a:solidFill>
+              <a:schemeClr val="bg1">
+                <a:lumMod val="85000"/>
+              </a:schemeClr>
+            </a:solidFill>
+          </a:ln>
+        </p:spPr>
+        <p:style>
+          <a:lnRef idx="2">
+            <a:schemeClr val="accent1"/>
+          </a:lnRef>
+          <a:fillRef idx="0">
+            <a:schemeClr val="accent1"/>
+          </a:fillRef>
+          <a:effectRef idx="1">
+            <a:schemeClr val="accent1"/>
+          </a:effectRef>
+          <a:fontRef idx="minor">
+            <a:schemeClr val="tx1"/>
+          </a:fontRef>
+        </p:style>
+      </p:cxnSp>
+      <p:sp>
+        <p:nvSpPr>
+          <p:cNvPr id="53" name="Abgerundetes Rechteck 52">
+            <a:extLst>
+              <a:ext uri="{FF2B5EF4-FFF2-40B4-BE49-F238E27FC236}">
+                <a16:creationId xmlns:a16="http://schemas.microsoft.com/office/drawing/2014/main" id="{F87B8779-9B15-2E58-9CCA-935D0A34CE9C}"/>
+              </a:ext>
+            </a:extLst>
+          </p:cNvPr>
+          <p:cNvSpPr/>
+          <p:nvPr/>
+        </p:nvSpPr>
+        <p:spPr>
+          <a:xfrm>
+            <a:off x="7759626" y="5915140"/>
+            <a:ext cx="807308" cy="321276"/>
+          </a:xfrm>
+          <a:prstGeom prst="roundRect">
+            <a:avLst/>
+          </a:prstGeom>
+          <a:solidFill>
+            <a:schemeClr val="bg1">
+              <a:lumMod val="85000"/>
+            </a:schemeClr>
+          </a:solidFill>
+        </p:spPr>
+        <p:style>
+          <a:lnRef idx="2">
+            <a:schemeClr val="accent1">
+              <a:shade val="15000"/>
+            </a:schemeClr>
+          </a:lnRef>
+          <a:fillRef idx="1">
+            <a:schemeClr val="accent1"/>
+          </a:fillRef>
+          <a:effectRef idx="0">
+            <a:schemeClr val="accent1"/>
+          </a:effectRef>
+          <a:fontRef idx="minor">
+            <a:schemeClr val="lt1"/>
+          </a:fontRef>
+        </p:style>
+        <p:txBody>
+          <a:bodyPr rtlCol="0" anchor="ctr"/>
+          <a:lstStyle/>
+          <a:p>
+            <a:pPr algn="ctr"/>
+            <a:endParaRPr lang="de-DE"/>
+          </a:p>
+        </p:txBody>
+      </p:sp>
+      <p:sp>
+        <p:nvSpPr>
+          <p:cNvPr id="54" name="Abgerundetes Rechteck 53">
+            <a:extLst>
+              <a:ext uri="{FF2B5EF4-FFF2-40B4-BE49-F238E27FC236}">
+                <a16:creationId xmlns:a16="http://schemas.microsoft.com/office/drawing/2014/main" id="{3F2FC9B8-9603-464D-2BF2-98AC21335259}"/>
+              </a:ext>
+            </a:extLst>
+          </p:cNvPr>
+          <p:cNvSpPr/>
+          <p:nvPr/>
+        </p:nvSpPr>
+        <p:spPr>
+          <a:xfrm>
+            <a:off x="6733970" y="5906977"/>
+            <a:ext cx="807308" cy="321276"/>
+          </a:xfrm>
+          <a:prstGeom prst="roundRect">
+            <a:avLst/>
+          </a:prstGeom>
+          <a:solidFill>
+            <a:schemeClr val="bg1">
+              <a:lumMod val="85000"/>
+            </a:schemeClr>
+          </a:solidFill>
+        </p:spPr>
+        <p:style>
+          <a:lnRef idx="2">
+            <a:schemeClr val="accent1">
+              <a:shade val="15000"/>
+            </a:schemeClr>
+          </a:lnRef>
+          <a:fillRef idx="1">
+            <a:schemeClr val="accent1"/>
+          </a:fillRef>
+          <a:effectRef idx="0">
+            <a:schemeClr val="accent1"/>
+          </a:effectRef>
+          <a:fontRef idx="minor">
+            <a:schemeClr val="lt1"/>
+          </a:fontRef>
+        </p:style>
+        <p:txBody>
+          <a:bodyPr rtlCol="0" anchor="ctr"/>
+          <a:lstStyle/>
+          <a:p>
+            <a:pPr algn="ctr"/>
+            <a:endParaRPr lang="de-DE"/>
+          </a:p>
+        </p:txBody>
+      </p:sp>
+      <p:sp>
+        <p:nvSpPr>
+          <p:cNvPr id="55" name="Textfeld 54">
+            <a:extLst>
+              <a:ext uri="{FF2B5EF4-FFF2-40B4-BE49-F238E27FC236}">
+                <a16:creationId xmlns:a16="http://schemas.microsoft.com/office/drawing/2014/main" id="{9AB10013-1C58-E8E0-359C-326CCFB4A883}"/>
               </a:ext>
             </a:extLst>
           </p:cNvPr>
@@ -3520,8 +5271,8 @@
         </p:nvSpPr>
         <p:spPr>
           <a:xfrm>
-            <a:off x="3696983" y="1827902"/>
-            <a:ext cx="1207219" cy="276999"/>
+            <a:off x="7842004" y="5903799"/>
+            <a:ext cx="642551" cy="338554"/>
           </a:xfrm>
           <a:prstGeom prst="rect">
             <a:avLst/>
@@ -3534,317 +5285,114 @@
           </a:bodyPr>
           <a:lstStyle/>
           <a:p>
-            <a:r>
-              <a:rPr lang="de-DE" sz="1200" dirty="0">
-                <a:latin typeface="Roboto Mono" pitchFamily="49" charset="0"/>
-                <a:ea typeface="Roboto Mono" pitchFamily="49" charset="0"/>
-              </a:rPr>
-              <a:t>Location: </a:t>
-            </a:r>
-          </a:p>
-        </p:txBody>
-      </p:sp>
-      <p:sp>
-        <p:nvSpPr>
-          <p:cNvPr id="9" name="Textfeld 8">
-            <a:extLst>
-              <a:ext uri="{FF2B5EF4-FFF2-40B4-BE49-F238E27FC236}">
-                <a16:creationId xmlns:a16="http://schemas.microsoft.com/office/drawing/2014/main" id="{4EE8A300-9548-A63B-B7E8-7CA63050534D}"/>
-              </a:ext>
-            </a:extLst>
-          </p:cNvPr>
-          <p:cNvSpPr txBox="1"/>
+            <a:pPr algn="ctr"/>
+            <a:r>
+              <a:rPr lang="de-DE" sz="800" dirty="0"/>
+              <a:t>Create JIRA </a:t>
+            </a:r>
+            <a:r>
+              <a:rPr lang="de-DE" sz="800" dirty="0" err="1"/>
+              <a:t>Issue</a:t>
+            </a:r>
+            <a:endParaRPr lang="de-DE" sz="800" dirty="0"/>
+          </a:p>
+        </p:txBody>
+      </p:sp>
+      <p:pic>
+        <p:nvPicPr>
+          <p:cNvPr id="1026" name="Picture 2" descr="Nerthus | Order of the Sacred Mannerbunde">
+            <a:hlinkClick r:id="rId2"/>
+            <a:extLst>
+              <a:ext uri="{FF2B5EF4-FFF2-40B4-BE49-F238E27FC236}">
+                <a16:creationId xmlns:a16="http://schemas.microsoft.com/office/drawing/2014/main" id="{93A9C266-4001-9F53-38A1-A461297C7BFA}"/>
+              </a:ext>
+            </a:extLst>
+          </p:cNvPr>
+          <p:cNvPicPr>
+            <a:picLocks noChangeAspect="1" noChangeArrowheads="1"/>
+          </p:cNvPicPr>
           <p:nvPr/>
-        </p:nvSpPr>
-        <p:spPr>
+        </p:nvPicPr>
+        <p:blipFill>
+          <a:blip r:embed="rId3">
+            <a:extLst>
+              <a:ext uri="{28A0092B-C50C-407E-A947-70E740481C1C}">
+                <a14:useLocalDpi xmlns:a14="http://schemas.microsoft.com/office/drawing/2010/main" val="0"/>
+              </a:ext>
+            </a:extLst>
+          </a:blip>
+          <a:srcRect/>
+          <a:stretch>
+            <a:fillRect/>
+          </a:stretch>
+        </p:blipFill>
+        <p:spPr bwMode="auto">
           <a:xfrm>
-            <a:off x="5157627" y="1827902"/>
-            <a:ext cx="2628471" cy="276999"/>
+            <a:off x="471205" y="726441"/>
+            <a:ext cx="2286000" cy="2286000"/>
           </a:xfrm>
           <a:prstGeom prst="rect">
             <a:avLst/>
           </a:prstGeom>
           <a:noFill/>
+          <a:extLst>
+            <a:ext uri="{909E8E84-426E-40DD-AFC4-6F175D3DCCD1}">
+              <a14:hiddenFill xmlns:a14="http://schemas.microsoft.com/office/drawing/2010/main">
+                <a:solidFill>
+                  <a:srgbClr val="FFFFFF"/>
+                </a:solidFill>
+              </a14:hiddenFill>
+            </a:ext>
+          </a:extLst>
         </p:spPr>
-        <p:txBody>
-          <a:bodyPr wrap="square" rtlCol="0">
-            <a:spAutoFit/>
-          </a:bodyPr>
-          <a:lstStyle/>
-          <a:p>
-            <a:r>
-              <a:rPr lang="de-DE" sz="1200" b="1" dirty="0">
-                <a:latin typeface="Roboto Mono" pitchFamily="49" charset="0"/>
-                <a:ea typeface="Roboto Mono" pitchFamily="49" charset="0"/>
-              </a:rPr>
-              <a:t>Earth</a:t>
-            </a:r>
-          </a:p>
-        </p:txBody>
-      </p:sp>
-      <p:sp>
-        <p:nvSpPr>
-          <p:cNvPr id="10" name="Textfeld 9">
-            <a:extLst>
-              <a:ext uri="{FF2B5EF4-FFF2-40B4-BE49-F238E27FC236}">
-                <a16:creationId xmlns:a16="http://schemas.microsoft.com/office/drawing/2014/main" id="{2C6DB231-C392-B6FF-53D8-B8AEA9EFA859}"/>
-              </a:ext>
-            </a:extLst>
-          </p:cNvPr>
-          <p:cNvSpPr txBox="1"/>
+      </p:pic>
+      <p:pic>
+        <p:nvPicPr>
+          <p:cNvPr id="1028" name="Picture 4" descr="Mother Nerthus [Pendant]">
+            <a:extLst>
+              <a:ext uri="{FF2B5EF4-FFF2-40B4-BE49-F238E27FC236}">
+                <a16:creationId xmlns:a16="http://schemas.microsoft.com/office/drawing/2014/main" id="{4F28BB54-742D-8B07-4ECD-53AC3924665D}"/>
+              </a:ext>
+            </a:extLst>
+          </p:cNvPr>
+          <p:cNvPicPr>
+            <a:picLocks noChangeAspect="1" noChangeArrowheads="1"/>
+          </p:cNvPicPr>
           <p:nvPr/>
-        </p:nvSpPr>
-        <p:spPr>
+        </p:nvPicPr>
+        <p:blipFill>
+          <a:blip r:embed="rId4">
+            <a:extLst>
+              <a:ext uri="{28A0092B-C50C-407E-A947-70E740481C1C}">
+                <a14:useLocalDpi xmlns:a14="http://schemas.microsoft.com/office/drawing/2010/main" val="0"/>
+              </a:ext>
+            </a:extLst>
+          </a:blip>
+          <a:srcRect/>
+          <a:stretch>
+            <a:fillRect/>
+          </a:stretch>
+        </p:blipFill>
+        <p:spPr bwMode="auto">
           <a:xfrm>
-            <a:off x="3707261" y="1251286"/>
-            <a:ext cx="1676407" cy="276999"/>
+            <a:off x="3747889" y="143483"/>
+            <a:ext cx="410137" cy="412669"/>
           </a:xfrm>
           <a:prstGeom prst="rect">
             <a:avLst/>
           </a:prstGeom>
           <a:noFill/>
+          <a:extLst>
+            <a:ext uri="{909E8E84-426E-40DD-AFC4-6F175D3DCCD1}">
+              <a14:hiddenFill xmlns:a14="http://schemas.microsoft.com/office/drawing/2010/main">
+                <a:solidFill>
+                  <a:srgbClr val="FFFFFF"/>
+                </a:solidFill>
+              </a14:hiddenFill>
+            </a:ext>
+          </a:extLst>
         </p:spPr>
-        <p:txBody>
-          <a:bodyPr wrap="square" rtlCol="0">
-            <a:spAutoFit/>
-          </a:bodyPr>
-          <a:lstStyle/>
-          <a:p>
-            <a:r>
-              <a:rPr lang="de-DE" sz="1200" dirty="0" err="1">
-                <a:latin typeface="Roboto Mono" pitchFamily="49" charset="0"/>
-                <a:ea typeface="Roboto Mono" pitchFamily="49" charset="0"/>
-              </a:rPr>
-              <a:t>Application</a:t>
-            </a:r>
-            <a:r>
-              <a:rPr lang="de-DE" sz="1200" dirty="0">
-                <a:latin typeface="Roboto Mono" pitchFamily="49" charset="0"/>
-                <a:ea typeface="Roboto Mono" pitchFamily="49" charset="0"/>
-              </a:rPr>
-              <a:t>: </a:t>
-            </a:r>
-          </a:p>
-        </p:txBody>
-      </p:sp>
-      <p:sp>
-        <p:nvSpPr>
-          <p:cNvPr id="11" name="Textfeld 10">
-            <a:extLst>
-              <a:ext uri="{FF2B5EF4-FFF2-40B4-BE49-F238E27FC236}">
-                <a16:creationId xmlns:a16="http://schemas.microsoft.com/office/drawing/2014/main" id="{ECB4D198-84AA-D88B-AA97-F77B1EDC63D9}"/>
-              </a:ext>
-            </a:extLst>
-          </p:cNvPr>
-          <p:cNvSpPr txBox="1"/>
-          <p:nvPr/>
-        </p:nvSpPr>
-        <p:spPr>
-          <a:xfrm>
-            <a:off x="5167904" y="1251286"/>
-            <a:ext cx="2628471" cy="276999"/>
-          </a:xfrm>
-          <a:prstGeom prst="rect">
-            <a:avLst/>
-          </a:prstGeom>
-          <a:noFill/>
-        </p:spPr>
-        <p:txBody>
-          <a:bodyPr wrap="square" rtlCol="0">
-            <a:spAutoFit/>
-          </a:bodyPr>
-          <a:lstStyle/>
-          <a:p>
-            <a:r>
-              <a:rPr lang="de-DE" sz="1200" b="1" dirty="0">
-                <a:latin typeface="Roboto Mono" pitchFamily="49" charset="0"/>
-                <a:ea typeface="Roboto Mono" pitchFamily="49" charset="0"/>
-              </a:rPr>
-              <a:t>Domain Name </a:t>
-            </a:r>
-            <a:r>
-              <a:rPr lang="de-DE" sz="1200" dirty="0">
-                <a:latin typeface="Roboto Mono" pitchFamily="49" charset="0"/>
-                <a:ea typeface="Roboto Mono" pitchFamily="49" charset="0"/>
-              </a:rPr>
-              <a:t>/</a:t>
-            </a:r>
-            <a:r>
-              <a:rPr lang="de-DE" sz="1200" b="1" dirty="0">
-                <a:latin typeface="Roboto Mono" pitchFamily="49" charset="0"/>
-                <a:ea typeface="Roboto Mono" pitchFamily="49" charset="0"/>
-              </a:rPr>
-              <a:t> 15</a:t>
-            </a:r>
-          </a:p>
-        </p:txBody>
-      </p:sp>
-      <p:sp>
-        <p:nvSpPr>
-          <p:cNvPr id="17" name="Textfeld 16">
-            <a:extLst>
-              <a:ext uri="{FF2B5EF4-FFF2-40B4-BE49-F238E27FC236}">
-                <a16:creationId xmlns:a16="http://schemas.microsoft.com/office/drawing/2014/main" id="{BFE30170-49AC-C348-E720-3EB657CA9DF0}"/>
-              </a:ext>
-            </a:extLst>
-          </p:cNvPr>
-          <p:cNvSpPr txBox="1"/>
-          <p:nvPr/>
-        </p:nvSpPr>
-        <p:spPr>
-          <a:xfrm>
-            <a:off x="8979613" y="647272"/>
-            <a:ext cx="1954189" cy="1754326"/>
-          </a:xfrm>
-          <a:prstGeom prst="rect">
-            <a:avLst/>
-          </a:prstGeom>
-          <a:noFill/>
-        </p:spPr>
-        <p:txBody>
-          <a:bodyPr wrap="none" rtlCol="0">
-            <a:spAutoFit/>
-          </a:bodyPr>
-          <a:lstStyle/>
-          <a:p>
-            <a:r>
-              <a:rPr lang="de-DE" dirty="0" err="1"/>
-              <a:t>application</a:t>
-            </a:r>
-            <a:r>
-              <a:rPr lang="de-DE" dirty="0"/>
-              <a:t>-name</a:t>
-            </a:r>
-          </a:p>
-          <a:p>
-            <a:r>
-              <a:rPr lang="de-DE" dirty="0"/>
-              <a:t>domain-name</a:t>
-            </a:r>
-          </a:p>
-          <a:p>
-            <a:r>
-              <a:rPr lang="de-DE" dirty="0"/>
-              <a:t>domain-</a:t>
-            </a:r>
-            <a:r>
-              <a:rPr lang="de-DE" dirty="0" err="1"/>
-              <a:t>id</a:t>
-            </a:r>
-            <a:endParaRPr lang="de-DE" dirty="0"/>
-          </a:p>
-          <a:p>
-            <a:r>
-              <a:rPr lang="de-DE" dirty="0" err="1"/>
-              <a:t>location</a:t>
-            </a:r>
-            <a:r>
-              <a:rPr lang="de-DE" dirty="0"/>
-              <a:t>-info</a:t>
-            </a:r>
-          </a:p>
-          <a:p>
-            <a:r>
-              <a:rPr lang="de-DE" dirty="0" err="1"/>
-              <a:t>severity</a:t>
-            </a:r>
-            <a:r>
-              <a:rPr lang="de-DE" dirty="0"/>
-              <a:t>-level</a:t>
-            </a:r>
-          </a:p>
-          <a:p>
-            <a:r>
-              <a:rPr lang="de-DE" dirty="0" err="1"/>
-              <a:t>timestamp</a:t>
-            </a:r>
-            <a:endParaRPr lang="de-DE" dirty="0"/>
-          </a:p>
-        </p:txBody>
-      </p:sp>
-      <p:sp>
-        <p:nvSpPr>
-          <p:cNvPr id="18" name="Textfeld 17">
-            <a:extLst>
-              <a:ext uri="{FF2B5EF4-FFF2-40B4-BE49-F238E27FC236}">
-                <a16:creationId xmlns:a16="http://schemas.microsoft.com/office/drawing/2014/main" id="{396809C0-69C8-EDD9-C42F-95DC70E744D1}"/>
-              </a:ext>
-            </a:extLst>
-          </p:cNvPr>
-          <p:cNvSpPr txBox="1"/>
-          <p:nvPr/>
-        </p:nvSpPr>
-        <p:spPr>
-          <a:xfrm>
-            <a:off x="3688422" y="2144461"/>
-            <a:ext cx="1387012" cy="276999"/>
-          </a:xfrm>
-          <a:prstGeom prst="rect">
-            <a:avLst/>
-          </a:prstGeom>
-          <a:noFill/>
-        </p:spPr>
-        <p:txBody>
-          <a:bodyPr wrap="square" rtlCol="0">
-            <a:spAutoFit/>
-          </a:bodyPr>
-          <a:lstStyle/>
-          <a:p>
-            <a:r>
-              <a:rPr lang="de-DE" sz="1200" dirty="0" err="1">
-                <a:latin typeface="Roboto Mono" pitchFamily="49" charset="0"/>
-                <a:ea typeface="Roboto Mono" pitchFamily="49" charset="0"/>
-              </a:rPr>
-              <a:t>Timestamp</a:t>
-            </a:r>
-            <a:r>
-              <a:rPr lang="de-DE" sz="1200" dirty="0">
-                <a:latin typeface="Roboto Mono" pitchFamily="49" charset="0"/>
-                <a:ea typeface="Roboto Mono" pitchFamily="49" charset="0"/>
-              </a:rPr>
-              <a:t>: </a:t>
-            </a:r>
-          </a:p>
-        </p:txBody>
-      </p:sp>
-      <p:sp>
-        <p:nvSpPr>
-          <p:cNvPr id="19" name="Textfeld 18">
-            <a:extLst>
-              <a:ext uri="{FF2B5EF4-FFF2-40B4-BE49-F238E27FC236}">
-                <a16:creationId xmlns:a16="http://schemas.microsoft.com/office/drawing/2014/main" id="{09EDC858-1AA0-1AB6-10D7-ACB15C33B801}"/>
-              </a:ext>
-            </a:extLst>
-          </p:cNvPr>
-          <p:cNvSpPr txBox="1"/>
-          <p:nvPr/>
-        </p:nvSpPr>
-        <p:spPr>
-          <a:xfrm>
-            <a:off x="5149066" y="2144461"/>
-            <a:ext cx="3943563" cy="276999"/>
-          </a:xfrm>
-          <a:prstGeom prst="rect">
-            <a:avLst/>
-          </a:prstGeom>
-          <a:noFill/>
-        </p:spPr>
-        <p:txBody>
-          <a:bodyPr wrap="square" rtlCol="0">
-            <a:spAutoFit/>
-          </a:bodyPr>
-          <a:lstStyle/>
-          <a:p>
-            <a:r>
-              <a:rPr lang="de-DE" sz="1200" b="1" dirty="0">
-                <a:latin typeface="Roboto Mono" pitchFamily="49" charset="0"/>
-                <a:ea typeface="Roboto Mono" pitchFamily="49" charset="0"/>
-              </a:rPr>
-              <a:t>2023-11-06T17:55:21.340587401+01:00</a:t>
-            </a:r>
-          </a:p>
-        </p:txBody>
-      </p:sp>
+      </p:pic>
     </p:spTree>
     <p:extLst>
       <p:ext uri="{BB962C8B-B14F-4D97-AF65-F5344CB8AC3E}">

</xml_diff>